<commit_message>
Modified the sketch for the pitch video
</commit_message>
<xml_diff>
--- a/Team_Contributions/Alwin/Pitch video/Pitch video slides.pptx
+++ b/Team_Contributions/Alwin/Pitch video/Pitch video slides.pptx
@@ -5,13 +5,27 @@
     <p:sldMasterId id="2147483660" r:id="rId1"/>
   </p:sldMasterIdLst>
   <p:sldIdLst>
-    <p:sldId id="257" r:id="rId2"/>
-    <p:sldId id="258" r:id="rId3"/>
-    <p:sldId id="259" r:id="rId4"/>
-    <p:sldId id="263" r:id="rId5"/>
-    <p:sldId id="260" r:id="rId6"/>
-    <p:sldId id="261" r:id="rId7"/>
-    <p:sldId id="262" r:id="rId8"/>
+    <p:sldId id="264" r:id="rId2"/>
+    <p:sldId id="265" r:id="rId3"/>
+    <p:sldId id="267" r:id="rId4"/>
+    <p:sldId id="268" r:id="rId5"/>
+    <p:sldId id="269" r:id="rId6"/>
+    <p:sldId id="270" r:id="rId7"/>
+    <p:sldId id="266" r:id="rId8"/>
+    <p:sldId id="271" r:id="rId9"/>
+    <p:sldId id="272" r:id="rId10"/>
+    <p:sldId id="273" r:id="rId11"/>
+    <p:sldId id="274" r:id="rId12"/>
+    <p:sldId id="275" r:id="rId13"/>
+    <p:sldId id="276" r:id="rId14"/>
+    <p:sldId id="277" r:id="rId15"/>
+    <p:sldId id="261" r:id="rId16"/>
+    <p:sldId id="262" r:id="rId17"/>
+    <p:sldId id="259" r:id="rId18"/>
+    <p:sldId id="263" r:id="rId19"/>
+    <p:sldId id="257" r:id="rId20"/>
+    <p:sldId id="258" r:id="rId21"/>
+    <p:sldId id="260" r:id="rId22"/>
   </p:sldIdLst>
   <p:sldSz cx="12192000" cy="6858000"/>
   <p:notesSz cx="6858000" cy="9144000"/>
@@ -110,6 +124,11 @@
       </a:defRPr>
     </a:lvl9pPr>
   </p:defaultTextStyle>
+  <p:extLst>
+    <p:ext uri="{EFAFB233-063F-42B5-8137-9DF3F51BA10A}">
+      <p15:sldGuideLst xmlns:p15="http://schemas.microsoft.com/office/powerpoint/2012/main"/>
+    </p:ext>
+  </p:extLst>
 </p:presentation>
 </file>
 
@@ -284,7 +303,7 @@
           <a:p>
             <a:fld id="{A66F81B9-CE0D-4E2C-B2A7-B1BC74198C34}" type="datetimeFigureOut">
               <a:rPr lang="en-AU" smtClean="0"/>
-              <a:t>3/10/2020</a:t>
+              <a:t>5/10/2020</a:t>
             </a:fld>
             <a:endParaRPr lang="en-AU"/>
           </a:p>
@@ -596,7 +615,7 @@
           <a:p>
             <a:fld id="{A66F81B9-CE0D-4E2C-B2A7-B1BC74198C34}" type="datetimeFigureOut">
               <a:rPr lang="en-AU" smtClean="0"/>
-              <a:t>3/10/2020</a:t>
+              <a:t>5/10/2020</a:t>
             </a:fld>
             <a:endParaRPr lang="en-AU"/>
           </a:p>
@@ -818,7 +837,7 @@
           <a:p>
             <a:fld id="{A66F81B9-CE0D-4E2C-B2A7-B1BC74198C34}" type="datetimeFigureOut">
               <a:rPr lang="en-AU" smtClean="0"/>
-              <a:t>3/10/2020</a:t>
+              <a:t>5/10/2020</a:t>
             </a:fld>
             <a:endParaRPr lang="en-AU"/>
           </a:p>
@@ -1109,7 +1128,7 @@
           <a:p>
             <a:fld id="{A66F81B9-CE0D-4E2C-B2A7-B1BC74198C34}" type="datetimeFigureOut">
               <a:rPr lang="en-AU" smtClean="0"/>
-              <a:t>3/10/2020</a:t>
+              <a:t>5/10/2020</a:t>
             </a:fld>
             <a:endParaRPr lang="en-AU"/>
           </a:p>
@@ -1563,7 +1582,7 @@
           <a:p>
             <a:fld id="{A66F81B9-CE0D-4E2C-B2A7-B1BC74198C34}" type="datetimeFigureOut">
               <a:rPr lang="en-AU" smtClean="0"/>
-              <a:t>3/10/2020</a:t>
+              <a:t>5/10/2020</a:t>
             </a:fld>
             <a:endParaRPr lang="en-AU"/>
           </a:p>
@@ -2139,7 +2158,7 @@
           <a:p>
             <a:fld id="{A66F81B9-CE0D-4E2C-B2A7-B1BC74198C34}" type="datetimeFigureOut">
               <a:rPr lang="en-AU" smtClean="0"/>
-              <a:t>3/10/2020</a:t>
+              <a:t>5/10/2020</a:t>
             </a:fld>
             <a:endParaRPr lang="en-AU"/>
           </a:p>
@@ -2991,7 +3010,7 @@
           <a:p>
             <a:fld id="{A66F81B9-CE0D-4E2C-B2A7-B1BC74198C34}" type="datetimeFigureOut">
               <a:rPr lang="en-AU" smtClean="0"/>
-              <a:t>3/10/2020</a:t>
+              <a:t>5/10/2020</a:t>
             </a:fld>
             <a:endParaRPr lang="en-AU"/>
           </a:p>
@@ -3196,7 +3215,7 @@
           <a:p>
             <a:fld id="{A66F81B9-CE0D-4E2C-B2A7-B1BC74198C34}" type="datetimeFigureOut">
               <a:rPr lang="en-AU" smtClean="0"/>
-              <a:t>3/10/2020</a:t>
+              <a:t>5/10/2020</a:t>
             </a:fld>
             <a:endParaRPr lang="en-AU"/>
           </a:p>
@@ -3410,7 +3429,7 @@
           <a:p>
             <a:fld id="{A66F81B9-CE0D-4E2C-B2A7-B1BC74198C34}" type="datetimeFigureOut">
               <a:rPr lang="en-AU" smtClean="0"/>
-              <a:t>3/10/2020</a:t>
+              <a:t>5/10/2020</a:t>
             </a:fld>
             <a:endParaRPr lang="en-AU"/>
           </a:p>
@@ -3598,7 +3617,7 @@
           <a:p>
             <a:fld id="{A66F81B9-CE0D-4E2C-B2A7-B1BC74198C34}" type="datetimeFigureOut">
               <a:rPr lang="en-AU" smtClean="0"/>
-              <a:t>3/10/2020</a:t>
+              <a:t>5/10/2020</a:t>
             </a:fld>
             <a:endParaRPr lang="en-AU"/>
           </a:p>
@@ -3815,7 +3834,7 @@
           <a:p>
             <a:fld id="{A66F81B9-CE0D-4E2C-B2A7-B1BC74198C34}" type="datetimeFigureOut">
               <a:rPr lang="en-AU" smtClean="0"/>
-              <a:t>3/10/2020</a:t>
+              <a:t>5/10/2020</a:t>
             </a:fld>
             <a:endParaRPr lang="en-AU"/>
           </a:p>
@@ -4095,7 +4114,7 @@
           <a:p>
             <a:fld id="{A66F81B9-CE0D-4E2C-B2A7-B1BC74198C34}" type="datetimeFigureOut">
               <a:rPr lang="en-AU" smtClean="0"/>
-              <a:t>3/10/2020</a:t>
+              <a:t>5/10/2020</a:t>
             </a:fld>
             <a:endParaRPr lang="en-AU"/>
           </a:p>
@@ -4362,7 +4381,7 @@
           <a:p>
             <a:fld id="{A66F81B9-CE0D-4E2C-B2A7-B1BC74198C34}" type="datetimeFigureOut">
               <a:rPr lang="en-AU" smtClean="0"/>
-              <a:t>3/10/2020</a:t>
+              <a:t>5/10/2020</a:t>
             </a:fld>
             <a:endParaRPr lang="en-AU"/>
           </a:p>
@@ -4777,7 +4796,7 @@
           <a:p>
             <a:fld id="{A66F81B9-CE0D-4E2C-B2A7-B1BC74198C34}" type="datetimeFigureOut">
               <a:rPr lang="en-AU" smtClean="0"/>
-              <a:t>3/10/2020</a:t>
+              <a:t>5/10/2020</a:t>
             </a:fld>
             <a:endParaRPr lang="en-AU"/>
           </a:p>
@@ -4925,7 +4944,7 @@
           <a:p>
             <a:fld id="{A66F81B9-CE0D-4E2C-B2A7-B1BC74198C34}" type="datetimeFigureOut">
               <a:rPr lang="en-AU" smtClean="0"/>
-              <a:t>3/10/2020</a:t>
+              <a:t>5/10/2020</a:t>
             </a:fld>
             <a:endParaRPr lang="en-AU"/>
           </a:p>
@@ -5050,7 +5069,7 @@
           <a:p>
             <a:fld id="{A66F81B9-CE0D-4E2C-B2A7-B1BC74198C34}" type="datetimeFigureOut">
               <a:rPr lang="en-AU" smtClean="0"/>
-              <a:t>3/10/2020</a:t>
+              <a:t>5/10/2020</a:t>
             </a:fld>
             <a:endParaRPr lang="en-AU"/>
           </a:p>
@@ -5329,7 +5348,7 @@
           <a:p>
             <a:fld id="{A66F81B9-CE0D-4E2C-B2A7-B1BC74198C34}" type="datetimeFigureOut">
               <a:rPr lang="en-AU" smtClean="0"/>
-              <a:t>3/10/2020</a:t>
+              <a:t>5/10/2020</a:t>
             </a:fld>
             <a:endParaRPr lang="en-AU"/>
           </a:p>
@@ -5641,7 +5660,7 @@
           <a:p>
             <a:fld id="{A66F81B9-CE0D-4E2C-B2A7-B1BC74198C34}" type="datetimeFigureOut">
               <a:rPr lang="en-AU" smtClean="0"/>
-              <a:t>3/10/2020</a:t>
+              <a:t>5/10/2020</a:t>
             </a:fld>
             <a:endParaRPr lang="en-AU"/>
           </a:p>
@@ -5894,7 +5913,7 @@
           <a:p>
             <a:fld id="{A66F81B9-CE0D-4E2C-B2A7-B1BC74198C34}" type="datetimeFigureOut">
               <a:rPr lang="en-AU" smtClean="0"/>
-              <a:t>3/10/2020</a:t>
+              <a:t>5/10/2020</a:t>
             </a:fld>
             <a:endParaRPr lang="en-AU"/>
           </a:p>
@@ -6344,6 +6363,1336 @@
           <p:cNvPr id="2" name="Title 1">
             <a:extLst>
               <a:ext uri="{FF2B5EF4-FFF2-40B4-BE49-F238E27FC236}">
+                <a16:creationId xmlns:a16="http://schemas.microsoft.com/office/drawing/2014/main" id="{74B9DFBA-19EB-4E4F-8E9E-2F4EF1D19C71}"/>
+              </a:ext>
+            </a:extLst>
+          </p:cNvPr>
+          <p:cNvSpPr>
+            <a:spLocks noGrp="1"/>
+          </p:cNvSpPr>
+          <p:nvPr>
+            <p:ph type="ctrTitle"/>
+          </p:nvPr>
+        </p:nvSpPr>
+        <p:spPr/>
+        <p:txBody>
+          <a:bodyPr/>
+          <a:lstStyle/>
+          <a:p>
+            <a:r>
+              <a:rPr lang="en-US" dirty="0"/>
+              <a:t>INTRODUCTORY VIDEO (5 – 10 sec)</a:t>
+            </a:r>
+            <a:endParaRPr lang="en-AU" dirty="0"/>
+          </a:p>
+        </p:txBody>
+      </p:sp>
+    </p:spTree>
+    <p:extLst>
+      <p:ext uri="{BB962C8B-B14F-4D97-AF65-F5344CB8AC3E}">
+        <p14:creationId xmlns:p14="http://schemas.microsoft.com/office/powerpoint/2010/main" val="3086138131"/>
+      </p:ext>
+    </p:extLst>
+  </p:cSld>
+  <p:clrMapOvr>
+    <a:masterClrMapping/>
+  </p:clrMapOvr>
+</p:sld>
+</file>
+
+<file path=ppt/slides/slide10.xml><?xml version="1.0" encoding="utf-8"?>
+<p:sld xmlns:a="http://schemas.openxmlformats.org/drawingml/2006/main" xmlns:r="http://schemas.openxmlformats.org/officeDocument/2006/relationships" xmlns:p="http://schemas.openxmlformats.org/presentationml/2006/main">
+  <p:cSld>
+    <p:spTree>
+      <p:nvGrpSpPr>
+        <p:cNvPr id="1" name=""/>
+        <p:cNvGrpSpPr/>
+        <p:nvPr/>
+      </p:nvGrpSpPr>
+      <p:grpSpPr>
+        <a:xfrm>
+          <a:off x="0" y="0"/>
+          <a:ext cx="0" cy="0"/>
+          <a:chOff x="0" y="0"/>
+          <a:chExt cx="0" cy="0"/>
+        </a:xfrm>
+      </p:grpSpPr>
+      <p:sp>
+        <p:nvSpPr>
+          <p:cNvPr id="2" name="Title 1">
+            <a:extLst>
+              <a:ext uri="{FF2B5EF4-FFF2-40B4-BE49-F238E27FC236}">
+                <a16:creationId xmlns:a16="http://schemas.microsoft.com/office/drawing/2014/main" id="{361F690F-E897-4587-BCE5-CF2FED86CF63}"/>
+              </a:ext>
+            </a:extLst>
+          </p:cNvPr>
+          <p:cNvSpPr>
+            <a:spLocks noGrp="1"/>
+          </p:cNvSpPr>
+          <p:nvPr>
+            <p:ph type="title"/>
+          </p:nvPr>
+        </p:nvSpPr>
+        <p:spPr/>
+        <p:txBody>
+          <a:bodyPr/>
+          <a:lstStyle/>
+          <a:p>
+            <a:r>
+              <a:rPr lang="en-AU" dirty="0"/>
+              <a:t>Age and gender detection</a:t>
+            </a:r>
+          </a:p>
+        </p:txBody>
+      </p:sp>
+      <p:sp>
+        <p:nvSpPr>
+          <p:cNvPr id="3" name="Content Placeholder 2">
+            <a:extLst>
+              <a:ext uri="{FF2B5EF4-FFF2-40B4-BE49-F238E27FC236}">
+                <a16:creationId xmlns:a16="http://schemas.microsoft.com/office/drawing/2014/main" id="{EB9919BE-D83E-4F7E-8506-9BDD936550D2}"/>
+              </a:ext>
+            </a:extLst>
+          </p:cNvPr>
+          <p:cNvSpPr>
+            <a:spLocks noGrp="1"/>
+          </p:cNvSpPr>
+          <p:nvPr>
+            <p:ph idx="1"/>
+          </p:nvPr>
+        </p:nvSpPr>
+        <p:spPr/>
+        <p:txBody>
+          <a:bodyPr/>
+          <a:lstStyle/>
+          <a:p>
+            <a:r>
+              <a:rPr lang="en-AU" dirty="0"/>
+              <a:t>In this example, machine will learn to detect age and gender from image</a:t>
+            </a:r>
+          </a:p>
+          <a:p>
+            <a:r>
+              <a:rPr lang="en-AU" dirty="0"/>
+              <a:t>upload and image and see the age and gender on the image</a:t>
+            </a:r>
+          </a:p>
+          <a:p>
+            <a:r>
+              <a:rPr lang="en-AU" dirty="0"/>
+              <a:t>Task has been divided into 4 blocks for deeper understanding</a:t>
+            </a:r>
+          </a:p>
+          <a:p>
+            <a:r>
+              <a:rPr lang="en-AU" dirty="0"/>
+              <a:t>Just drag and drop each block to see what happens</a:t>
+            </a:r>
+          </a:p>
+          <a:p>
+            <a:r>
+              <a:rPr lang="en-AU" dirty="0"/>
+              <a:t>Let’s see it in action</a:t>
+            </a:r>
+          </a:p>
+        </p:txBody>
+      </p:sp>
+    </p:spTree>
+    <p:extLst>
+      <p:ext uri="{BB962C8B-B14F-4D97-AF65-F5344CB8AC3E}">
+        <p14:creationId xmlns:p14="http://schemas.microsoft.com/office/powerpoint/2010/main" val="1426288809"/>
+      </p:ext>
+    </p:extLst>
+  </p:cSld>
+  <p:clrMapOvr>
+    <a:masterClrMapping/>
+  </p:clrMapOvr>
+</p:sld>
+</file>
+
+<file path=ppt/slides/slide11.xml><?xml version="1.0" encoding="utf-8"?>
+<p:sld xmlns:a="http://schemas.openxmlformats.org/drawingml/2006/main" xmlns:r="http://schemas.openxmlformats.org/officeDocument/2006/relationships" xmlns:p="http://schemas.openxmlformats.org/presentationml/2006/main">
+  <p:cSld>
+    <p:spTree>
+      <p:nvGrpSpPr>
+        <p:cNvPr id="1" name=""/>
+        <p:cNvGrpSpPr/>
+        <p:nvPr/>
+      </p:nvGrpSpPr>
+      <p:grpSpPr>
+        <a:xfrm>
+          <a:off x="0" y="0"/>
+          <a:ext cx="0" cy="0"/>
+          <a:chOff x="0" y="0"/>
+          <a:chExt cx="0" cy="0"/>
+        </a:xfrm>
+      </p:grpSpPr>
+      <p:sp>
+        <p:nvSpPr>
+          <p:cNvPr id="2" name="Title 1">
+            <a:extLst>
+              <a:ext uri="{FF2B5EF4-FFF2-40B4-BE49-F238E27FC236}">
+                <a16:creationId xmlns:a16="http://schemas.microsoft.com/office/drawing/2014/main" id="{A4B47363-A573-4572-9733-9D9D79F2A72E}"/>
+              </a:ext>
+            </a:extLst>
+          </p:cNvPr>
+          <p:cNvSpPr>
+            <a:spLocks noGrp="1"/>
+          </p:cNvSpPr>
+          <p:nvPr>
+            <p:ph type="title"/>
+          </p:nvPr>
+        </p:nvSpPr>
+        <p:spPr>
+          <a:xfrm>
+            <a:off x="913774" y="2630911"/>
+            <a:ext cx="10364451" cy="1596177"/>
+          </a:xfrm>
+        </p:spPr>
+        <p:txBody>
+          <a:bodyPr/>
+          <a:lstStyle/>
+          <a:p>
+            <a:r>
+              <a:rPr lang="en-AU" dirty="0"/>
+              <a:t>Demo age and gender</a:t>
+            </a:r>
+          </a:p>
+        </p:txBody>
+      </p:sp>
+    </p:spTree>
+    <p:extLst>
+      <p:ext uri="{BB962C8B-B14F-4D97-AF65-F5344CB8AC3E}">
+        <p14:creationId xmlns:p14="http://schemas.microsoft.com/office/powerpoint/2010/main" val="1988667906"/>
+      </p:ext>
+    </p:extLst>
+  </p:cSld>
+  <p:clrMapOvr>
+    <a:masterClrMapping/>
+  </p:clrMapOvr>
+</p:sld>
+</file>
+
+<file path=ppt/slides/slide12.xml><?xml version="1.0" encoding="utf-8"?>
+<p:sld xmlns:a="http://schemas.openxmlformats.org/drawingml/2006/main" xmlns:r="http://schemas.openxmlformats.org/officeDocument/2006/relationships" xmlns:p="http://schemas.openxmlformats.org/presentationml/2006/main">
+  <p:cSld>
+    <p:spTree>
+      <p:nvGrpSpPr>
+        <p:cNvPr id="1" name=""/>
+        <p:cNvGrpSpPr/>
+        <p:nvPr/>
+      </p:nvGrpSpPr>
+      <p:grpSpPr>
+        <a:xfrm>
+          <a:off x="0" y="0"/>
+          <a:ext cx="0" cy="0"/>
+          <a:chOff x="0" y="0"/>
+          <a:chExt cx="0" cy="0"/>
+        </a:xfrm>
+      </p:grpSpPr>
+      <p:sp>
+        <p:nvSpPr>
+          <p:cNvPr id="2" name="Title 1">
+            <a:extLst>
+              <a:ext uri="{FF2B5EF4-FFF2-40B4-BE49-F238E27FC236}">
+                <a16:creationId xmlns:a16="http://schemas.microsoft.com/office/drawing/2014/main" id="{171A1D54-675B-48B0-BAEE-E628E099390C}"/>
+              </a:ext>
+            </a:extLst>
+          </p:cNvPr>
+          <p:cNvSpPr>
+            <a:spLocks noGrp="1"/>
+          </p:cNvSpPr>
+          <p:nvPr>
+            <p:ph type="title"/>
+          </p:nvPr>
+        </p:nvSpPr>
+        <p:spPr/>
+        <p:txBody>
+          <a:bodyPr/>
+          <a:lstStyle/>
+          <a:p>
+            <a:r>
+              <a:rPr lang="en-AU" dirty="0"/>
+              <a:t>Sentiment analysis</a:t>
+            </a:r>
+          </a:p>
+        </p:txBody>
+      </p:sp>
+      <p:sp>
+        <p:nvSpPr>
+          <p:cNvPr id="3" name="Content Placeholder 2">
+            <a:extLst>
+              <a:ext uri="{FF2B5EF4-FFF2-40B4-BE49-F238E27FC236}">
+                <a16:creationId xmlns:a16="http://schemas.microsoft.com/office/drawing/2014/main" id="{178F4D63-8E91-444A-BF05-E8685EC6CFB5}"/>
+              </a:ext>
+            </a:extLst>
+          </p:cNvPr>
+          <p:cNvSpPr>
+            <a:spLocks noGrp="1"/>
+          </p:cNvSpPr>
+          <p:nvPr>
+            <p:ph idx="1"/>
+          </p:nvPr>
+        </p:nvSpPr>
+        <p:spPr/>
+        <p:txBody>
+          <a:bodyPr/>
+          <a:lstStyle/>
+          <a:p>
+            <a:r>
+              <a:rPr lang="en-AU" dirty="0"/>
+              <a:t>In this exampled, learn how to Detect the sentiment behind a tweet or written statement.</a:t>
+            </a:r>
+          </a:p>
+          <a:p>
+            <a:r>
+              <a:rPr lang="en-AU" dirty="0"/>
+              <a:t>Simply write something in the textbox or get a random tweet to get started.</a:t>
+            </a:r>
+          </a:p>
+          <a:p>
+            <a:r>
+              <a:rPr lang="en-AU" dirty="0"/>
+              <a:t>As before, there are 4 blocks which can simply be dragged and dropped.</a:t>
+            </a:r>
+          </a:p>
+          <a:p>
+            <a:r>
+              <a:rPr lang="en-AU" dirty="0"/>
+              <a:t>See what happens at each step in demo!</a:t>
+            </a:r>
+          </a:p>
+          <a:p>
+            <a:endParaRPr lang="en-AU" dirty="0"/>
+          </a:p>
+          <a:p>
+            <a:endParaRPr lang="en-AU" dirty="0"/>
+          </a:p>
+        </p:txBody>
+      </p:sp>
+    </p:spTree>
+    <p:extLst>
+      <p:ext uri="{BB962C8B-B14F-4D97-AF65-F5344CB8AC3E}">
+        <p14:creationId xmlns:p14="http://schemas.microsoft.com/office/powerpoint/2010/main" val="2446297754"/>
+      </p:ext>
+    </p:extLst>
+  </p:cSld>
+  <p:clrMapOvr>
+    <a:masterClrMapping/>
+  </p:clrMapOvr>
+</p:sld>
+</file>
+
+<file path=ppt/slides/slide13.xml><?xml version="1.0" encoding="utf-8"?>
+<p:sld xmlns:a="http://schemas.openxmlformats.org/drawingml/2006/main" xmlns:r="http://schemas.openxmlformats.org/officeDocument/2006/relationships" xmlns:p="http://schemas.openxmlformats.org/presentationml/2006/main">
+  <p:cSld>
+    <p:spTree>
+      <p:nvGrpSpPr>
+        <p:cNvPr id="1" name=""/>
+        <p:cNvGrpSpPr/>
+        <p:nvPr/>
+      </p:nvGrpSpPr>
+      <p:grpSpPr>
+        <a:xfrm>
+          <a:off x="0" y="0"/>
+          <a:ext cx="0" cy="0"/>
+          <a:chOff x="0" y="0"/>
+          <a:chExt cx="0" cy="0"/>
+        </a:xfrm>
+      </p:grpSpPr>
+      <p:sp>
+        <p:nvSpPr>
+          <p:cNvPr id="2" name="Title 1">
+            <a:extLst>
+              <a:ext uri="{FF2B5EF4-FFF2-40B4-BE49-F238E27FC236}">
+                <a16:creationId xmlns:a16="http://schemas.microsoft.com/office/drawing/2014/main" id="{A4B47363-A573-4572-9733-9D9D79F2A72E}"/>
+              </a:ext>
+            </a:extLst>
+          </p:cNvPr>
+          <p:cNvSpPr>
+            <a:spLocks noGrp="1"/>
+          </p:cNvSpPr>
+          <p:nvPr>
+            <p:ph type="title"/>
+          </p:nvPr>
+        </p:nvSpPr>
+        <p:spPr>
+          <a:xfrm>
+            <a:off x="913774" y="2630911"/>
+            <a:ext cx="10364451" cy="1596177"/>
+          </a:xfrm>
+        </p:spPr>
+        <p:txBody>
+          <a:bodyPr/>
+          <a:lstStyle/>
+          <a:p>
+            <a:r>
+              <a:rPr lang="en-AU" dirty="0"/>
+              <a:t>Demo Sentiment</a:t>
+            </a:r>
+          </a:p>
+        </p:txBody>
+      </p:sp>
+    </p:spTree>
+    <p:extLst>
+      <p:ext uri="{BB962C8B-B14F-4D97-AF65-F5344CB8AC3E}">
+        <p14:creationId xmlns:p14="http://schemas.microsoft.com/office/powerpoint/2010/main" val="998698454"/>
+      </p:ext>
+    </p:extLst>
+  </p:cSld>
+  <p:clrMapOvr>
+    <a:masterClrMapping/>
+  </p:clrMapOvr>
+</p:sld>
+</file>
+
+<file path=ppt/slides/slide14.xml><?xml version="1.0" encoding="utf-8"?>
+<p:sld xmlns:a="http://schemas.openxmlformats.org/drawingml/2006/main" xmlns:r="http://schemas.openxmlformats.org/officeDocument/2006/relationships" xmlns:p="http://schemas.openxmlformats.org/presentationml/2006/main">
+  <p:cSld>
+    <p:spTree>
+      <p:nvGrpSpPr>
+        <p:cNvPr id="1" name=""/>
+        <p:cNvGrpSpPr/>
+        <p:nvPr/>
+      </p:nvGrpSpPr>
+      <p:grpSpPr>
+        <a:xfrm>
+          <a:off x="0" y="0"/>
+          <a:ext cx="0" cy="0"/>
+          <a:chOff x="0" y="0"/>
+          <a:chExt cx="0" cy="0"/>
+        </a:xfrm>
+      </p:grpSpPr>
+      <p:sp>
+        <p:nvSpPr>
+          <p:cNvPr id="2" name="Title 1">
+            <a:extLst>
+              <a:ext uri="{FF2B5EF4-FFF2-40B4-BE49-F238E27FC236}">
+                <a16:creationId xmlns:a16="http://schemas.microsoft.com/office/drawing/2014/main" id="{3CB7E1CE-45F0-40D2-99AE-F97B12233D59}"/>
+              </a:ext>
+            </a:extLst>
+          </p:cNvPr>
+          <p:cNvSpPr>
+            <a:spLocks noGrp="1"/>
+          </p:cNvSpPr>
+          <p:nvPr>
+            <p:ph type="title"/>
+          </p:nvPr>
+        </p:nvSpPr>
+        <p:spPr/>
+        <p:txBody>
+          <a:bodyPr/>
+          <a:lstStyle/>
+          <a:p>
+            <a:r>
+              <a:rPr lang="en-AU" dirty="0"/>
+              <a:t>Technology stack</a:t>
+            </a:r>
+          </a:p>
+        </p:txBody>
+      </p:sp>
+      <p:sp>
+        <p:nvSpPr>
+          <p:cNvPr id="3" name="Content Placeholder 2">
+            <a:extLst>
+              <a:ext uri="{FF2B5EF4-FFF2-40B4-BE49-F238E27FC236}">
+                <a16:creationId xmlns:a16="http://schemas.microsoft.com/office/drawing/2014/main" id="{B8B503E1-D2DB-4F29-B5F2-18FF714DB4F7}"/>
+              </a:ext>
+            </a:extLst>
+          </p:cNvPr>
+          <p:cNvSpPr>
+            <a:spLocks noGrp="1"/>
+          </p:cNvSpPr>
+          <p:nvPr>
+            <p:ph idx="1"/>
+          </p:nvPr>
+        </p:nvSpPr>
+        <p:spPr/>
+        <p:txBody>
+          <a:bodyPr/>
+          <a:lstStyle/>
+          <a:p>
+            <a:r>
+              <a:rPr lang="en-AU" dirty="0"/>
+              <a:t>Backend: Django and python</a:t>
+            </a:r>
+          </a:p>
+          <a:p>
+            <a:r>
+              <a:rPr lang="en-AU" dirty="0"/>
+              <a:t>Frontend: bootstrap for responsive web design, </a:t>
+            </a:r>
+            <a:r>
+              <a:rPr lang="en-AU" dirty="0" err="1"/>
+              <a:t>jquery</a:t>
+            </a:r>
+            <a:r>
+              <a:rPr lang="en-AU" dirty="0"/>
+              <a:t> and </a:t>
+            </a:r>
+            <a:r>
+              <a:rPr lang="en-AU" dirty="0" err="1"/>
+              <a:t>javascript</a:t>
+            </a:r>
+            <a:r>
+              <a:rPr lang="en-AU" dirty="0"/>
+              <a:t> for interactions and drag &amp; Drop.</a:t>
+            </a:r>
+          </a:p>
+          <a:p>
+            <a:r>
+              <a:rPr lang="en-AU" dirty="0"/>
+              <a:t>Examples: Machine learning libraries such as </a:t>
+            </a:r>
+            <a:r>
+              <a:rPr lang="en-AU" dirty="0" err="1"/>
+              <a:t>nltk</a:t>
+            </a:r>
+            <a:r>
+              <a:rPr lang="en-AU" dirty="0"/>
+              <a:t>, </a:t>
+            </a:r>
+            <a:r>
+              <a:rPr lang="en-AU" dirty="0" err="1"/>
+              <a:t>opencv</a:t>
+            </a:r>
+            <a:r>
+              <a:rPr lang="en-AU" dirty="0"/>
+              <a:t>, </a:t>
+            </a:r>
+            <a:r>
+              <a:rPr lang="en-AU" dirty="0" err="1"/>
+              <a:t>dlib</a:t>
+            </a:r>
+            <a:r>
+              <a:rPr lang="en-AU" dirty="0"/>
+              <a:t> for running the examples.</a:t>
+            </a:r>
+          </a:p>
+        </p:txBody>
+      </p:sp>
+    </p:spTree>
+    <p:extLst>
+      <p:ext uri="{BB962C8B-B14F-4D97-AF65-F5344CB8AC3E}">
+        <p14:creationId xmlns:p14="http://schemas.microsoft.com/office/powerpoint/2010/main" val="360148561"/>
+      </p:ext>
+    </p:extLst>
+  </p:cSld>
+  <p:clrMapOvr>
+    <a:masterClrMapping/>
+  </p:clrMapOvr>
+</p:sld>
+</file>
+
+<file path=ppt/slides/slide15.xml><?xml version="1.0" encoding="utf-8"?>
+<p:sld xmlns:a="http://schemas.openxmlformats.org/drawingml/2006/main" xmlns:r="http://schemas.openxmlformats.org/officeDocument/2006/relationships" xmlns:p="http://schemas.openxmlformats.org/presentationml/2006/main">
+  <p:cSld>
+    <p:bg>
+      <p:bgRef idx="1002">
+        <a:schemeClr val="bg1"/>
+      </p:bgRef>
+    </p:bg>
+    <p:spTree>
+      <p:nvGrpSpPr>
+        <p:cNvPr id="1" name=""/>
+        <p:cNvGrpSpPr/>
+        <p:nvPr/>
+      </p:nvGrpSpPr>
+      <p:grpSpPr>
+        <a:xfrm>
+          <a:off x="0" y="0"/>
+          <a:ext cx="0" cy="0"/>
+          <a:chOff x="0" y="0"/>
+          <a:chExt cx="0" cy="0"/>
+        </a:xfrm>
+      </p:grpSpPr>
+      <p:sp>
+        <p:nvSpPr>
+          <p:cNvPr id="2" name="Title 1">
+            <a:extLst>
+              <a:ext uri="{FF2B5EF4-FFF2-40B4-BE49-F238E27FC236}">
+                <a16:creationId xmlns:a16="http://schemas.microsoft.com/office/drawing/2014/main" id="{5654AA42-1CB2-4AA9-9667-852CA24EEB17}"/>
+              </a:ext>
+            </a:extLst>
+          </p:cNvPr>
+          <p:cNvSpPr>
+            <a:spLocks noGrp="1"/>
+          </p:cNvSpPr>
+          <p:nvPr>
+            <p:ph type="title"/>
+          </p:nvPr>
+        </p:nvSpPr>
+        <p:spPr/>
+        <p:txBody>
+          <a:bodyPr>
+            <a:normAutofit/>
+          </a:bodyPr>
+          <a:lstStyle/>
+          <a:p>
+            <a:pPr algn="l"/>
+            <a:r>
+              <a:rPr lang="en-GB" sz="4400" b="1" dirty="0">
+                <a:solidFill>
+                  <a:schemeClr val="accent3">
+                    <a:lumMod val="75000"/>
+                  </a:schemeClr>
+                </a:solidFill>
+                <a:latin typeface="Bahnschrift SemiCondensed" panose="020B0502040204020203" pitchFamily="34" charset="0"/>
+              </a:rPr>
+              <a:t>What’s next</a:t>
+            </a:r>
+            <a:endParaRPr lang="en-AU" sz="4400" b="1" dirty="0">
+              <a:solidFill>
+                <a:schemeClr val="accent3">
+                  <a:lumMod val="75000"/>
+                </a:schemeClr>
+              </a:solidFill>
+              <a:latin typeface="Bahnschrift SemiCondensed" panose="020B0502040204020203" pitchFamily="34" charset="0"/>
+            </a:endParaRPr>
+          </a:p>
+        </p:txBody>
+      </p:sp>
+      <p:sp>
+        <p:nvSpPr>
+          <p:cNvPr id="3" name="Content Placeholder 2">
+            <a:extLst>
+              <a:ext uri="{FF2B5EF4-FFF2-40B4-BE49-F238E27FC236}">
+                <a16:creationId xmlns:a16="http://schemas.microsoft.com/office/drawing/2014/main" id="{F1C7AD93-4D19-40ED-8E9A-21322641B2AA}"/>
+              </a:ext>
+            </a:extLst>
+          </p:cNvPr>
+          <p:cNvSpPr>
+            <a:spLocks noGrp="1"/>
+          </p:cNvSpPr>
+          <p:nvPr>
+            <p:ph idx="1"/>
+          </p:nvPr>
+        </p:nvSpPr>
+        <p:spPr/>
+        <p:txBody>
+          <a:bodyPr>
+            <a:normAutofit/>
+          </a:bodyPr>
+          <a:lstStyle/>
+          <a:p>
+            <a:r>
+              <a:rPr lang="en-GB" sz="1800" dirty="0">
+                <a:latin typeface="Calibri" panose="020F0502020204030204" pitchFamily="34" charset="0"/>
+                <a:cs typeface="Calibri" panose="020F0502020204030204" pitchFamily="34" charset="0"/>
+              </a:rPr>
+              <a:t>Improve the aesthetics and interactions to make it more child friendly</a:t>
+            </a:r>
+          </a:p>
+          <a:p>
+            <a:r>
+              <a:rPr lang="en-GB" sz="1800" dirty="0">
+                <a:latin typeface="Calibri" panose="020F0502020204030204" pitchFamily="34" charset="0"/>
+                <a:cs typeface="Calibri" panose="020F0502020204030204" pitchFamily="34" charset="0"/>
+              </a:rPr>
+              <a:t>Improve the examples by setting difficulty levels like novice, intermediate and expert.</a:t>
+            </a:r>
+          </a:p>
+          <a:p>
+            <a:r>
+              <a:rPr lang="en-GB" sz="1800" dirty="0">
+                <a:latin typeface="Calibri" panose="020F0502020204030204" pitchFamily="34" charset="0"/>
+                <a:cs typeface="Calibri" panose="020F0502020204030204" pitchFamily="34" charset="0"/>
+              </a:rPr>
+              <a:t>Implement more example concepts, games and other imaginative ideas to peak the interest of kids</a:t>
+            </a:r>
+          </a:p>
+          <a:p>
+            <a:r>
+              <a:rPr lang="en-GB" sz="1800" dirty="0">
+                <a:latin typeface="Calibri" panose="020F0502020204030204" pitchFamily="34" charset="0"/>
+                <a:cs typeface="Calibri" panose="020F0502020204030204" pitchFamily="34" charset="0"/>
+              </a:rPr>
+              <a:t>Set up a user login system</a:t>
+            </a:r>
+            <a:endParaRPr lang="en-AU" sz="1800" dirty="0">
+              <a:latin typeface="Calibri" panose="020F0502020204030204" pitchFamily="34" charset="0"/>
+              <a:cs typeface="Calibri" panose="020F0502020204030204" pitchFamily="34" charset="0"/>
+            </a:endParaRPr>
+          </a:p>
+        </p:txBody>
+      </p:sp>
+    </p:spTree>
+    <p:extLst>
+      <p:ext uri="{BB962C8B-B14F-4D97-AF65-F5344CB8AC3E}">
+        <p14:creationId xmlns:p14="http://schemas.microsoft.com/office/powerpoint/2010/main" val="2202249229"/>
+      </p:ext>
+    </p:extLst>
+  </p:cSld>
+  <p:clrMapOvr>
+    <a:overrideClrMapping bg1="lt1" tx1="dk1" bg2="lt2" tx2="dk2" accent1="accent1" accent2="accent2" accent3="accent3" accent4="accent4" accent5="accent5" accent6="accent6" hlink="hlink" folHlink="folHlink"/>
+  </p:clrMapOvr>
+</p:sld>
+</file>
+
+<file path=ppt/slides/slide16.xml><?xml version="1.0" encoding="utf-8"?>
+<p:sld xmlns:a="http://schemas.openxmlformats.org/drawingml/2006/main" xmlns:r="http://schemas.openxmlformats.org/officeDocument/2006/relationships" xmlns:p="http://schemas.openxmlformats.org/presentationml/2006/main">
+  <p:cSld>
+    <p:spTree>
+      <p:nvGrpSpPr>
+        <p:cNvPr id="1" name=""/>
+        <p:cNvGrpSpPr/>
+        <p:nvPr/>
+      </p:nvGrpSpPr>
+      <p:grpSpPr>
+        <a:xfrm>
+          <a:off x="0" y="0"/>
+          <a:ext cx="0" cy="0"/>
+          <a:chOff x="0" y="0"/>
+          <a:chExt cx="0" cy="0"/>
+        </a:xfrm>
+      </p:grpSpPr>
+      <p:sp>
+        <p:nvSpPr>
+          <p:cNvPr id="2" name="Title 1">
+            <a:extLst>
+              <a:ext uri="{FF2B5EF4-FFF2-40B4-BE49-F238E27FC236}">
+                <a16:creationId xmlns:a16="http://schemas.microsoft.com/office/drawing/2014/main" id="{5654AA42-1CB2-4AA9-9667-852CA24EEB17}"/>
+              </a:ext>
+            </a:extLst>
+          </p:cNvPr>
+          <p:cNvSpPr>
+            <a:spLocks noGrp="1"/>
+          </p:cNvSpPr>
+          <p:nvPr>
+            <p:ph type="title"/>
+          </p:nvPr>
+        </p:nvSpPr>
+        <p:spPr/>
+        <p:txBody>
+          <a:bodyPr>
+            <a:normAutofit/>
+          </a:bodyPr>
+          <a:lstStyle/>
+          <a:p>
+            <a:pPr algn="l"/>
+            <a:r>
+              <a:rPr lang="en-GB" sz="4400" b="1" dirty="0">
+                <a:solidFill>
+                  <a:schemeClr val="accent3">
+                    <a:lumMod val="75000"/>
+                  </a:schemeClr>
+                </a:solidFill>
+                <a:latin typeface="Bahnschrift SemiCondensed" panose="020B0502040204020203" pitchFamily="34" charset="0"/>
+              </a:rPr>
+              <a:t>Conclusion</a:t>
+            </a:r>
+            <a:endParaRPr lang="en-AU" sz="4400" b="1" dirty="0">
+              <a:solidFill>
+                <a:schemeClr val="accent3">
+                  <a:lumMod val="75000"/>
+                </a:schemeClr>
+              </a:solidFill>
+              <a:latin typeface="Bahnschrift SemiCondensed" panose="020B0502040204020203" pitchFamily="34" charset="0"/>
+            </a:endParaRPr>
+          </a:p>
+        </p:txBody>
+      </p:sp>
+      <p:sp>
+        <p:nvSpPr>
+          <p:cNvPr id="3" name="Content Placeholder 2">
+            <a:extLst>
+              <a:ext uri="{FF2B5EF4-FFF2-40B4-BE49-F238E27FC236}">
+                <a16:creationId xmlns:a16="http://schemas.microsoft.com/office/drawing/2014/main" id="{F1C7AD93-4D19-40ED-8E9A-21322641B2AA}"/>
+              </a:ext>
+            </a:extLst>
+          </p:cNvPr>
+          <p:cNvSpPr>
+            <a:spLocks noGrp="1"/>
+          </p:cNvSpPr>
+          <p:nvPr>
+            <p:ph idx="1"/>
+          </p:nvPr>
+        </p:nvSpPr>
+        <p:spPr/>
+        <p:txBody>
+          <a:bodyPr>
+            <a:normAutofit/>
+          </a:bodyPr>
+          <a:lstStyle/>
+          <a:p>
+            <a:r>
+              <a:rPr lang="en-GB" sz="1800" dirty="0">
+                <a:latin typeface="Calibri" panose="020F0502020204030204" pitchFamily="34" charset="0"/>
+                <a:cs typeface="Calibri" panose="020F0502020204030204" pitchFamily="34" charset="0"/>
+              </a:rPr>
+              <a:t>A strong base has been developed that can be improved in future iterations</a:t>
+            </a:r>
+          </a:p>
+          <a:p>
+            <a:r>
+              <a:rPr lang="en-GB" sz="1800" dirty="0">
+                <a:latin typeface="Calibri" panose="020F0502020204030204" pitchFamily="34" charset="0"/>
+                <a:cs typeface="Calibri" panose="020F0502020204030204" pitchFamily="34" charset="0"/>
+              </a:rPr>
+              <a:t>Since this is a webapp, it can be hosted and accessed from anywhere</a:t>
+            </a:r>
+          </a:p>
+          <a:p>
+            <a:r>
+              <a:rPr lang="en-GB" sz="1800" dirty="0">
+                <a:latin typeface="Calibri" panose="020F0502020204030204" pitchFamily="34" charset="0"/>
+                <a:cs typeface="Calibri" panose="020F0502020204030204" pitchFamily="34" charset="0"/>
+              </a:rPr>
+              <a:t>Simple and common technologies are used, hence debugging and modification are affordable</a:t>
+            </a:r>
+          </a:p>
+          <a:p>
+            <a:r>
+              <a:rPr lang="en-GB" sz="1800" dirty="0">
+                <a:latin typeface="Calibri" panose="020F0502020204030204" pitchFamily="34" charset="0"/>
+                <a:cs typeface="Calibri" panose="020F0502020204030204" pitchFamily="34" charset="0"/>
+              </a:rPr>
+              <a:t>Can be employed as a self learning or teaching tool</a:t>
+            </a:r>
+            <a:endParaRPr lang="en-AU" sz="1800" dirty="0">
+              <a:latin typeface="Calibri" panose="020F0502020204030204" pitchFamily="34" charset="0"/>
+              <a:cs typeface="Calibri" panose="020F0502020204030204" pitchFamily="34" charset="0"/>
+            </a:endParaRPr>
+          </a:p>
+        </p:txBody>
+      </p:sp>
+    </p:spTree>
+    <p:extLst>
+      <p:ext uri="{BB962C8B-B14F-4D97-AF65-F5344CB8AC3E}">
+        <p14:creationId xmlns:p14="http://schemas.microsoft.com/office/powerpoint/2010/main" val="2214893645"/>
+      </p:ext>
+    </p:extLst>
+  </p:cSld>
+  <p:clrMapOvr>
+    <a:masterClrMapping/>
+  </p:clrMapOvr>
+</p:sld>
+</file>
+
+<file path=ppt/slides/slide17.xml><?xml version="1.0" encoding="utf-8"?>
+<p:sld xmlns:a="http://schemas.openxmlformats.org/drawingml/2006/main" xmlns:r="http://schemas.openxmlformats.org/officeDocument/2006/relationships" xmlns:p="http://schemas.openxmlformats.org/presentationml/2006/main" show="0">
+  <p:cSld>
+    <p:spTree>
+      <p:nvGrpSpPr>
+        <p:cNvPr id="1" name=""/>
+        <p:cNvGrpSpPr/>
+        <p:nvPr/>
+      </p:nvGrpSpPr>
+      <p:grpSpPr>
+        <a:xfrm>
+          <a:off x="0" y="0"/>
+          <a:ext cx="0" cy="0"/>
+          <a:chOff x="0" y="0"/>
+          <a:chExt cx="0" cy="0"/>
+        </a:xfrm>
+      </p:grpSpPr>
+      <p:sp>
+        <p:nvSpPr>
+          <p:cNvPr id="2" name="Title 1">
+            <a:extLst>
+              <a:ext uri="{FF2B5EF4-FFF2-40B4-BE49-F238E27FC236}">
+                <a16:creationId xmlns:a16="http://schemas.microsoft.com/office/drawing/2014/main" id="{5654AA42-1CB2-4AA9-9667-852CA24EEB17}"/>
+              </a:ext>
+            </a:extLst>
+          </p:cNvPr>
+          <p:cNvSpPr>
+            <a:spLocks noGrp="1"/>
+          </p:cNvSpPr>
+          <p:nvPr>
+            <p:ph type="title"/>
+          </p:nvPr>
+        </p:nvSpPr>
+        <p:spPr/>
+        <p:txBody>
+          <a:bodyPr>
+            <a:normAutofit/>
+          </a:bodyPr>
+          <a:lstStyle/>
+          <a:p>
+            <a:pPr algn="l"/>
+            <a:r>
+              <a:rPr lang="en-GB" sz="4400" b="1" dirty="0">
+                <a:solidFill>
+                  <a:schemeClr val="accent3">
+                    <a:lumMod val="75000"/>
+                  </a:schemeClr>
+                </a:solidFill>
+                <a:latin typeface="Bahnschrift SemiCondensed" panose="020B0502040204020203" pitchFamily="34" charset="0"/>
+              </a:rPr>
+              <a:t>Feature</a:t>
+            </a:r>
+            <a:r>
+              <a:rPr lang="en-GB" sz="4400" dirty="0">
+                <a:solidFill>
+                  <a:schemeClr val="accent3">
+                    <a:lumMod val="75000"/>
+                  </a:schemeClr>
+                </a:solidFill>
+                <a:latin typeface="Bahnschrift SemiCondensed" panose="020B0502040204020203" pitchFamily="34" charset="0"/>
+              </a:rPr>
+              <a:t> 1 – </a:t>
+            </a:r>
+            <a:r>
+              <a:rPr lang="en-GB" sz="2800" dirty="0">
+                <a:solidFill>
+                  <a:schemeClr val="accent3">
+                    <a:lumMod val="75000"/>
+                  </a:schemeClr>
+                </a:solidFill>
+                <a:latin typeface="Bahnschrift SemiCondensed" panose="020B0502040204020203" pitchFamily="34" charset="0"/>
+              </a:rPr>
+              <a:t>Age and gender detection</a:t>
+            </a:r>
+            <a:endParaRPr lang="en-AU" sz="4400" dirty="0">
+              <a:solidFill>
+                <a:schemeClr val="accent3">
+                  <a:lumMod val="75000"/>
+                </a:schemeClr>
+              </a:solidFill>
+              <a:latin typeface="Bahnschrift SemiCondensed" panose="020B0502040204020203" pitchFamily="34" charset="0"/>
+            </a:endParaRPr>
+          </a:p>
+        </p:txBody>
+      </p:sp>
+      <p:sp>
+        <p:nvSpPr>
+          <p:cNvPr id="3" name="Content Placeholder 2">
+            <a:extLst>
+              <a:ext uri="{FF2B5EF4-FFF2-40B4-BE49-F238E27FC236}">
+                <a16:creationId xmlns:a16="http://schemas.microsoft.com/office/drawing/2014/main" id="{F1C7AD93-4D19-40ED-8E9A-21322641B2AA}"/>
+              </a:ext>
+            </a:extLst>
+          </p:cNvPr>
+          <p:cNvSpPr>
+            <a:spLocks noGrp="1"/>
+          </p:cNvSpPr>
+          <p:nvPr>
+            <p:ph idx="1"/>
+          </p:nvPr>
+        </p:nvSpPr>
+        <p:spPr/>
+        <p:txBody>
+          <a:bodyPr>
+            <a:normAutofit lnSpcReduction="10000"/>
+          </a:bodyPr>
+          <a:lstStyle/>
+          <a:p>
+            <a:r>
+              <a:rPr lang="en-GB" sz="1800" dirty="0">
+                <a:latin typeface="Calibri" panose="020F0502020204030204" pitchFamily="34" charset="0"/>
+                <a:cs typeface="Calibri" panose="020F0502020204030204" pitchFamily="34" charset="0"/>
+              </a:rPr>
+              <a:t>Detecting age and gender from an image</a:t>
+            </a:r>
+          </a:p>
+          <a:p>
+            <a:r>
+              <a:rPr lang="en-GB" sz="1800" dirty="0">
+                <a:latin typeface="Calibri" panose="020F0502020204030204" pitchFamily="34" charset="0"/>
+                <a:cs typeface="Calibri" panose="020F0502020204030204" pitchFamily="34" charset="0"/>
+              </a:rPr>
+              <a:t>An image of a person can be uploaded and the final output is image with the persons age and gender written on it</a:t>
+            </a:r>
+          </a:p>
+          <a:p>
+            <a:r>
+              <a:rPr lang="en-GB" sz="1800" dirty="0">
+                <a:latin typeface="Calibri" panose="020F0502020204030204" pitchFamily="34" charset="0"/>
+                <a:cs typeface="Calibri" panose="020F0502020204030204" pitchFamily="34" charset="0"/>
+              </a:rPr>
+              <a:t>Four blocks, each has its own output</a:t>
+            </a:r>
+          </a:p>
+          <a:p>
+            <a:pPr marL="800100" lvl="1" indent="-342900">
+              <a:buFont typeface="+mj-lt"/>
+              <a:buAutoNum type="arabicPeriod"/>
+            </a:pPr>
+            <a:r>
+              <a:rPr lang="en-GB" sz="1600" dirty="0">
+                <a:latin typeface="Calibri" panose="020F0502020204030204" pitchFamily="34" charset="0"/>
+                <a:cs typeface="Calibri" panose="020F0502020204030204" pitchFamily="34" charset="0"/>
+              </a:rPr>
+              <a:t>Face detection – an output image with a square highlighting the face</a:t>
+            </a:r>
+          </a:p>
+          <a:p>
+            <a:pPr marL="800100" lvl="1" indent="-342900">
+              <a:buFont typeface="+mj-lt"/>
+              <a:buAutoNum type="arabicPeriod"/>
+            </a:pPr>
+            <a:r>
+              <a:rPr lang="en-GB" sz="1600" dirty="0">
+                <a:latin typeface="Calibri" panose="020F0502020204030204" pitchFamily="34" charset="0"/>
+                <a:cs typeface="Calibri" panose="020F0502020204030204" pitchFamily="34" charset="0"/>
+              </a:rPr>
+              <a:t>Feature detection – detects the facial features and highlights them using points</a:t>
+            </a:r>
+          </a:p>
+          <a:p>
+            <a:pPr marL="800100" lvl="1" indent="-342900">
+              <a:buFont typeface="+mj-lt"/>
+              <a:buAutoNum type="arabicPeriod"/>
+            </a:pPr>
+            <a:r>
+              <a:rPr lang="en-GB" sz="1600" dirty="0">
+                <a:latin typeface="Calibri" panose="020F0502020204030204" pitchFamily="34" charset="0"/>
+                <a:cs typeface="Calibri" panose="020F0502020204030204" pitchFamily="34" charset="0"/>
+              </a:rPr>
+              <a:t>Age detection – detects and writes the age range of the person</a:t>
+            </a:r>
+          </a:p>
+          <a:p>
+            <a:pPr marL="800100" lvl="1" indent="-342900">
+              <a:buFont typeface="+mj-lt"/>
+              <a:buAutoNum type="arabicPeriod"/>
+            </a:pPr>
+            <a:r>
+              <a:rPr lang="en-GB" sz="1600" dirty="0">
+                <a:latin typeface="Calibri" panose="020F0502020204030204" pitchFamily="34" charset="0"/>
+                <a:cs typeface="Calibri" panose="020F0502020204030204" pitchFamily="34" charset="0"/>
+              </a:rPr>
+              <a:t>Gender detection - detects and writes the gender of the person</a:t>
+            </a:r>
+            <a:endParaRPr lang="en-AU" sz="1600" dirty="0">
+              <a:latin typeface="Calibri" panose="020F0502020204030204" pitchFamily="34" charset="0"/>
+              <a:cs typeface="Calibri" panose="020F0502020204030204" pitchFamily="34" charset="0"/>
+            </a:endParaRPr>
+          </a:p>
+          <a:p>
+            <a:r>
+              <a:rPr lang="en-GB" dirty="0">
+                <a:latin typeface="Calibri" panose="020F0502020204030204" pitchFamily="34" charset="0"/>
+                <a:cs typeface="Calibri" panose="020F0502020204030204" pitchFamily="34" charset="0"/>
+              </a:rPr>
+              <a:t>The blocks have to dragged on in the order ( face </a:t>
+            </a:r>
+            <a:r>
+              <a:rPr lang="en-GB" dirty="0">
+                <a:solidFill>
+                  <a:srgbClr val="C00000"/>
+                </a:solidFill>
+                <a:latin typeface="Calibri" panose="020F0502020204030204" pitchFamily="34" charset="0"/>
+                <a:cs typeface="Calibri" panose="020F0502020204030204" pitchFamily="34" charset="0"/>
+              </a:rPr>
+              <a:t>-&gt;</a:t>
+            </a:r>
+            <a:r>
+              <a:rPr lang="en-GB" dirty="0">
+                <a:latin typeface="Calibri" panose="020F0502020204030204" pitchFamily="34" charset="0"/>
+                <a:cs typeface="Calibri" panose="020F0502020204030204" pitchFamily="34" charset="0"/>
+              </a:rPr>
+              <a:t> feature </a:t>
+            </a:r>
+            <a:r>
+              <a:rPr lang="en-GB" dirty="0">
+                <a:solidFill>
+                  <a:srgbClr val="C00000"/>
+                </a:solidFill>
+                <a:latin typeface="Calibri" panose="020F0502020204030204" pitchFamily="34" charset="0"/>
+                <a:cs typeface="Calibri" panose="020F0502020204030204" pitchFamily="34" charset="0"/>
+              </a:rPr>
+              <a:t>-&gt;</a:t>
+            </a:r>
+            <a:r>
+              <a:rPr lang="en-GB" dirty="0">
+                <a:latin typeface="Calibri" panose="020F0502020204030204" pitchFamily="34" charset="0"/>
+                <a:cs typeface="Calibri" panose="020F0502020204030204" pitchFamily="34" charset="0"/>
+              </a:rPr>
+              <a:t> age/gender)</a:t>
+            </a:r>
+            <a:endParaRPr lang="en-AU" dirty="0">
+              <a:latin typeface="Calibri" panose="020F0502020204030204" pitchFamily="34" charset="0"/>
+              <a:cs typeface="Calibri" panose="020F0502020204030204" pitchFamily="34" charset="0"/>
+            </a:endParaRPr>
+          </a:p>
+        </p:txBody>
+      </p:sp>
+    </p:spTree>
+    <p:extLst>
+      <p:ext uri="{BB962C8B-B14F-4D97-AF65-F5344CB8AC3E}">
+        <p14:creationId xmlns:p14="http://schemas.microsoft.com/office/powerpoint/2010/main" val="1029014537"/>
+      </p:ext>
+    </p:extLst>
+  </p:cSld>
+  <p:clrMapOvr>
+    <a:masterClrMapping/>
+  </p:clrMapOvr>
+</p:sld>
+</file>
+
+<file path=ppt/slides/slide18.xml><?xml version="1.0" encoding="utf-8"?>
+<p:sld xmlns:a="http://schemas.openxmlformats.org/drawingml/2006/main" xmlns:r="http://schemas.openxmlformats.org/officeDocument/2006/relationships" xmlns:p="http://schemas.openxmlformats.org/presentationml/2006/main" show="0">
+  <p:cSld>
+    <p:spTree>
+      <p:nvGrpSpPr>
+        <p:cNvPr id="1" name=""/>
+        <p:cNvGrpSpPr/>
+        <p:nvPr/>
+      </p:nvGrpSpPr>
+      <p:grpSpPr>
+        <a:xfrm>
+          <a:off x="0" y="0"/>
+          <a:ext cx="0" cy="0"/>
+          <a:chOff x="0" y="0"/>
+          <a:chExt cx="0" cy="0"/>
+        </a:xfrm>
+      </p:grpSpPr>
+      <p:sp>
+        <p:nvSpPr>
+          <p:cNvPr id="2" name="Title 1">
+            <a:extLst>
+              <a:ext uri="{FF2B5EF4-FFF2-40B4-BE49-F238E27FC236}">
+                <a16:creationId xmlns:a16="http://schemas.microsoft.com/office/drawing/2014/main" id="{5654AA42-1CB2-4AA9-9667-852CA24EEB17}"/>
+              </a:ext>
+            </a:extLst>
+          </p:cNvPr>
+          <p:cNvSpPr>
+            <a:spLocks noGrp="1"/>
+          </p:cNvSpPr>
+          <p:nvPr>
+            <p:ph type="title"/>
+          </p:nvPr>
+        </p:nvSpPr>
+        <p:spPr/>
+        <p:txBody>
+          <a:bodyPr>
+            <a:normAutofit/>
+          </a:bodyPr>
+          <a:lstStyle/>
+          <a:p>
+            <a:pPr algn="l"/>
+            <a:r>
+              <a:rPr lang="en-GB" sz="4400" b="1" dirty="0">
+                <a:solidFill>
+                  <a:schemeClr val="accent3">
+                    <a:lumMod val="75000"/>
+                  </a:schemeClr>
+                </a:solidFill>
+                <a:latin typeface="Bahnschrift SemiCondensed" panose="020B0502040204020203" pitchFamily="34" charset="0"/>
+              </a:rPr>
+              <a:t>Feature 2 – </a:t>
+            </a:r>
+            <a:r>
+              <a:rPr lang="en-GB" sz="2800" dirty="0">
+                <a:solidFill>
+                  <a:schemeClr val="accent3">
+                    <a:lumMod val="75000"/>
+                  </a:schemeClr>
+                </a:solidFill>
+                <a:latin typeface="Bahnschrift SemiCondensed" panose="020B0502040204020203" pitchFamily="34" charset="0"/>
+              </a:rPr>
+              <a:t>sentiment analysis</a:t>
+            </a:r>
+            <a:endParaRPr lang="en-AU" sz="4400" b="1" dirty="0">
+              <a:solidFill>
+                <a:schemeClr val="accent3">
+                  <a:lumMod val="75000"/>
+                </a:schemeClr>
+              </a:solidFill>
+              <a:latin typeface="Bahnschrift SemiCondensed" panose="020B0502040204020203" pitchFamily="34" charset="0"/>
+            </a:endParaRPr>
+          </a:p>
+        </p:txBody>
+      </p:sp>
+      <p:sp>
+        <p:nvSpPr>
+          <p:cNvPr id="3" name="Content Placeholder 2">
+            <a:extLst>
+              <a:ext uri="{FF2B5EF4-FFF2-40B4-BE49-F238E27FC236}">
+                <a16:creationId xmlns:a16="http://schemas.microsoft.com/office/drawing/2014/main" id="{F1C7AD93-4D19-40ED-8E9A-21322641B2AA}"/>
+              </a:ext>
+            </a:extLst>
+          </p:cNvPr>
+          <p:cNvSpPr>
+            <a:spLocks noGrp="1"/>
+          </p:cNvSpPr>
+          <p:nvPr>
+            <p:ph idx="1"/>
+          </p:nvPr>
+        </p:nvSpPr>
+        <p:spPr/>
+        <p:txBody>
+          <a:bodyPr>
+            <a:normAutofit lnSpcReduction="10000"/>
+          </a:bodyPr>
+          <a:lstStyle/>
+          <a:p>
+            <a:r>
+              <a:rPr lang="en-GB" sz="1800" dirty="0">
+                <a:latin typeface="Calibri" panose="020F0502020204030204" pitchFamily="34" charset="0"/>
+                <a:cs typeface="Calibri" panose="020F0502020204030204" pitchFamily="34" charset="0"/>
+              </a:rPr>
+              <a:t>Detecting the sentiment of a sentence or tweet</a:t>
+            </a:r>
+          </a:p>
+          <a:p>
+            <a:r>
+              <a:rPr lang="en-AU" sz="1800" dirty="0">
+                <a:latin typeface="Calibri" panose="020F0502020204030204" pitchFamily="34" charset="0"/>
+                <a:cs typeface="Calibri" panose="020F0502020204030204" pitchFamily="34" charset="0"/>
+              </a:rPr>
+              <a:t>A random tweet can be generated or a sentence can be typed, and machine will identify if the sentiment of it happy or sad</a:t>
+            </a:r>
+          </a:p>
+          <a:p>
+            <a:r>
+              <a:rPr lang="en-AU" sz="1800" dirty="0">
+                <a:latin typeface="Calibri" panose="020F0502020204030204" pitchFamily="34" charset="0"/>
+                <a:cs typeface="Calibri" panose="020F0502020204030204" pitchFamily="34" charset="0"/>
+              </a:rPr>
+              <a:t>Four blocks</a:t>
+            </a:r>
+          </a:p>
+          <a:p>
+            <a:pPr marL="800100" lvl="1" indent="-342900">
+              <a:buFont typeface="+mj-lt"/>
+              <a:buAutoNum type="arabicPeriod"/>
+            </a:pPr>
+            <a:r>
+              <a:rPr lang="en-AU" sz="1600" dirty="0">
+                <a:latin typeface="Calibri" panose="020F0502020204030204" pitchFamily="34" charset="0"/>
+                <a:cs typeface="Calibri" panose="020F0502020204030204" pitchFamily="34" charset="0"/>
+              </a:rPr>
+              <a:t>Tokenization – converts the sentence into tokens and displays them</a:t>
+            </a:r>
+          </a:p>
+          <a:p>
+            <a:pPr marL="800100" lvl="1" indent="-342900">
+              <a:buFont typeface="+mj-lt"/>
+              <a:buAutoNum type="arabicPeriod"/>
+            </a:pPr>
+            <a:r>
+              <a:rPr lang="en-AU" sz="1600" dirty="0">
+                <a:latin typeface="Calibri" panose="020F0502020204030204" pitchFamily="34" charset="0"/>
+                <a:cs typeface="Calibri" panose="020F0502020204030204" pitchFamily="34" charset="0"/>
+              </a:rPr>
+              <a:t>Stemming – identify and display on the root words of all tokens</a:t>
+            </a:r>
+          </a:p>
+          <a:p>
+            <a:pPr marL="800100" lvl="1" indent="-342900">
+              <a:buFont typeface="+mj-lt"/>
+              <a:buAutoNum type="arabicPeriod"/>
+            </a:pPr>
+            <a:r>
+              <a:rPr lang="en-AU" sz="1600" dirty="0">
+                <a:latin typeface="Calibri" panose="020F0502020204030204" pitchFamily="34" charset="0"/>
+                <a:cs typeface="Calibri" panose="020F0502020204030204" pitchFamily="34" charset="0"/>
+              </a:rPr>
+              <a:t>Stop word removal – remove all stop words and display the rest</a:t>
+            </a:r>
+          </a:p>
+          <a:p>
+            <a:pPr marL="800100" lvl="1" indent="-342900">
+              <a:buFont typeface="+mj-lt"/>
+              <a:buAutoNum type="arabicPeriod"/>
+            </a:pPr>
+            <a:r>
+              <a:rPr lang="en-AU" sz="1600" dirty="0">
+                <a:latin typeface="Calibri" panose="020F0502020204030204" pitchFamily="34" charset="0"/>
+                <a:cs typeface="Calibri" panose="020F0502020204030204" pitchFamily="34" charset="0"/>
+              </a:rPr>
+              <a:t>Detect sentiment – display if the sentiment is happy or sad.</a:t>
+            </a:r>
+          </a:p>
+          <a:p>
+            <a:r>
+              <a:rPr lang="en-AU" sz="1800" dirty="0">
+                <a:latin typeface="Calibri" panose="020F0502020204030204" pitchFamily="34" charset="0"/>
+                <a:cs typeface="Calibri" panose="020F0502020204030204" pitchFamily="34" charset="0"/>
+              </a:rPr>
+              <a:t>The order of the blocks is; tokenization</a:t>
+            </a:r>
+            <a:r>
+              <a:rPr lang="en-AU" sz="1800" dirty="0">
+                <a:solidFill>
+                  <a:srgbClr val="C00000"/>
+                </a:solidFill>
+                <a:latin typeface="Calibri" panose="020F0502020204030204" pitchFamily="34" charset="0"/>
+                <a:cs typeface="Calibri" panose="020F0502020204030204" pitchFamily="34" charset="0"/>
+              </a:rPr>
+              <a:t> -&gt; </a:t>
+            </a:r>
+            <a:r>
+              <a:rPr lang="en-AU" sz="1800" dirty="0">
+                <a:latin typeface="Calibri" panose="020F0502020204030204" pitchFamily="34" charset="0"/>
+                <a:cs typeface="Calibri" panose="020F0502020204030204" pitchFamily="34" charset="0"/>
+              </a:rPr>
+              <a:t>stemming </a:t>
+            </a:r>
+            <a:r>
+              <a:rPr lang="en-AU" sz="1800" dirty="0">
+                <a:solidFill>
+                  <a:srgbClr val="C00000"/>
+                </a:solidFill>
+                <a:latin typeface="Calibri" panose="020F0502020204030204" pitchFamily="34" charset="0"/>
+                <a:cs typeface="Calibri" panose="020F0502020204030204" pitchFamily="34" charset="0"/>
+              </a:rPr>
+              <a:t>-&gt;</a:t>
+            </a:r>
+            <a:r>
+              <a:rPr lang="en-AU" sz="1800" dirty="0">
+                <a:latin typeface="Calibri" panose="020F0502020204030204" pitchFamily="34" charset="0"/>
+                <a:cs typeface="Calibri" panose="020F0502020204030204" pitchFamily="34" charset="0"/>
+              </a:rPr>
+              <a:t> stop words </a:t>
+            </a:r>
+            <a:r>
+              <a:rPr lang="en-AU" sz="1800" dirty="0">
+                <a:solidFill>
+                  <a:srgbClr val="C00000"/>
+                </a:solidFill>
+                <a:latin typeface="Calibri" panose="020F0502020204030204" pitchFamily="34" charset="0"/>
+                <a:cs typeface="Calibri" panose="020F0502020204030204" pitchFamily="34" charset="0"/>
+              </a:rPr>
+              <a:t>-&gt;</a:t>
+            </a:r>
+            <a:r>
+              <a:rPr lang="en-AU" sz="1800" dirty="0">
+                <a:latin typeface="Calibri" panose="020F0502020204030204" pitchFamily="34" charset="0"/>
+                <a:cs typeface="Calibri" panose="020F0502020204030204" pitchFamily="34" charset="0"/>
+              </a:rPr>
+              <a:t> sentiment</a:t>
+            </a:r>
+          </a:p>
+        </p:txBody>
+      </p:sp>
+    </p:spTree>
+    <p:extLst>
+      <p:ext uri="{BB962C8B-B14F-4D97-AF65-F5344CB8AC3E}">
+        <p14:creationId xmlns:p14="http://schemas.microsoft.com/office/powerpoint/2010/main" val="1766342802"/>
+      </p:ext>
+    </p:extLst>
+  </p:cSld>
+  <p:clrMapOvr>
+    <a:masterClrMapping/>
+  </p:clrMapOvr>
+</p:sld>
+</file>
+
+<file path=ppt/slides/slide19.xml><?xml version="1.0" encoding="utf-8"?>
+<p:sld xmlns:a="http://schemas.openxmlformats.org/drawingml/2006/main" xmlns:r="http://schemas.openxmlformats.org/officeDocument/2006/relationships" xmlns:p="http://schemas.openxmlformats.org/presentationml/2006/main" show="0">
+  <p:cSld>
+    <p:spTree>
+      <p:nvGrpSpPr>
+        <p:cNvPr id="1" name=""/>
+        <p:cNvGrpSpPr/>
+        <p:nvPr/>
+      </p:nvGrpSpPr>
+      <p:grpSpPr>
+        <a:xfrm>
+          <a:off x="0" y="0"/>
+          <a:ext cx="0" cy="0"/>
+          <a:chOff x="0" y="0"/>
+          <a:chExt cx="0" cy="0"/>
+        </a:xfrm>
+      </p:grpSpPr>
+      <p:sp>
+        <p:nvSpPr>
+          <p:cNvPr id="2" name="Title 1">
+            <a:extLst>
+              <a:ext uri="{FF2B5EF4-FFF2-40B4-BE49-F238E27FC236}">
                 <a16:creationId xmlns:a16="http://schemas.microsoft.com/office/drawing/2014/main" id="{5654AA42-1CB2-4AA9-9667-852CA24EEB17}"/>
               </a:ext>
             </a:extLst>
@@ -6541,6 +7890,111 @@
           <p:cNvPr id="2" name="Title 1">
             <a:extLst>
               <a:ext uri="{FF2B5EF4-FFF2-40B4-BE49-F238E27FC236}">
+                <a16:creationId xmlns:a16="http://schemas.microsoft.com/office/drawing/2014/main" id="{BF073803-106A-43ED-B0DE-ABE12B2A584A}"/>
+              </a:ext>
+            </a:extLst>
+          </p:cNvPr>
+          <p:cNvSpPr>
+            <a:spLocks noGrp="1"/>
+          </p:cNvSpPr>
+          <p:nvPr>
+            <p:ph type="title"/>
+          </p:nvPr>
+        </p:nvSpPr>
+        <p:spPr/>
+        <p:txBody>
+          <a:bodyPr/>
+          <a:lstStyle/>
+          <a:p>
+            <a:r>
+              <a:rPr lang="en-US" dirty="0"/>
+              <a:t>WHY? (25 - 30 secs)</a:t>
+            </a:r>
+            <a:endParaRPr lang="en-AU" dirty="0"/>
+          </a:p>
+        </p:txBody>
+      </p:sp>
+      <p:sp>
+        <p:nvSpPr>
+          <p:cNvPr id="3" name="Content Placeholder 2">
+            <a:extLst>
+              <a:ext uri="{FF2B5EF4-FFF2-40B4-BE49-F238E27FC236}">
+                <a16:creationId xmlns:a16="http://schemas.microsoft.com/office/drawing/2014/main" id="{2B354E60-955A-4613-BAE6-9F68DEDCF41B}"/>
+              </a:ext>
+            </a:extLst>
+          </p:cNvPr>
+          <p:cNvSpPr>
+            <a:spLocks noGrp="1"/>
+          </p:cNvSpPr>
+          <p:nvPr>
+            <p:ph sz="quarter" idx="13"/>
+          </p:nvPr>
+        </p:nvSpPr>
+        <p:spPr/>
+        <p:txBody>
+          <a:bodyPr/>
+          <a:lstStyle/>
+          <a:p>
+            <a:r>
+              <a:rPr lang="en-US" dirty="0"/>
+              <a:t>Data</a:t>
+            </a:r>
+          </a:p>
+          <a:p>
+            <a:r>
+              <a:rPr lang="en-US" dirty="0"/>
+              <a:t>AI</a:t>
+            </a:r>
+          </a:p>
+          <a:p>
+            <a:r>
+              <a:rPr lang="en-US" dirty="0"/>
+              <a:t>ML</a:t>
+            </a:r>
+          </a:p>
+          <a:p>
+            <a:pPr marL="0" indent="0">
+              <a:buNone/>
+            </a:pPr>
+            <a:endParaRPr lang="en-AU" dirty="0"/>
+          </a:p>
+        </p:txBody>
+      </p:sp>
+    </p:spTree>
+    <p:extLst>
+      <p:ext uri="{BB962C8B-B14F-4D97-AF65-F5344CB8AC3E}">
+        <p14:creationId xmlns:p14="http://schemas.microsoft.com/office/powerpoint/2010/main" val="1533248136"/>
+      </p:ext>
+    </p:extLst>
+  </p:cSld>
+  <p:clrMapOvr>
+    <a:masterClrMapping/>
+  </p:clrMapOvr>
+</p:sld>
+</file>
+
+<file path=ppt/slides/slide20.xml><?xml version="1.0" encoding="utf-8"?>
+<p:sld xmlns:a="http://schemas.openxmlformats.org/drawingml/2006/main" xmlns:r="http://schemas.openxmlformats.org/officeDocument/2006/relationships" xmlns:p="http://schemas.openxmlformats.org/presentationml/2006/main" show="0">
+  <p:cSld>
+    <p:spTree>
+      <p:nvGrpSpPr>
+        <p:cNvPr id="1" name=""/>
+        <p:cNvGrpSpPr/>
+        <p:nvPr/>
+      </p:nvGrpSpPr>
+      <p:grpSpPr>
+        <a:xfrm>
+          <a:off x="0" y="0"/>
+          <a:ext cx="0" cy="0"/>
+          <a:chOff x="0" y="0"/>
+          <a:chExt cx="0" cy="0"/>
+        </a:xfrm>
+      </p:grpSpPr>
+      <p:sp>
+        <p:nvSpPr>
+          <p:cNvPr id="2" name="Title 1">
+            <a:extLst>
+              <a:ext uri="{FF2B5EF4-FFF2-40B4-BE49-F238E27FC236}">
                 <a16:creationId xmlns:a16="http://schemas.microsoft.com/office/drawing/2014/main" id="{5654AA42-1CB2-4AA9-9667-852CA24EEB17}"/>
               </a:ext>
             </a:extLst>
@@ -6679,6 +8133,172 @@
     <p:extLst>
       <p:ext uri="{BB962C8B-B14F-4D97-AF65-F5344CB8AC3E}">
         <p14:creationId xmlns:p14="http://schemas.microsoft.com/office/powerpoint/2010/main" val="2321534422"/>
+      </p:ext>
+    </p:extLst>
+  </p:cSld>
+  <p:clrMapOvr>
+    <a:masterClrMapping/>
+  </p:clrMapOvr>
+</p:sld>
+</file>
+
+<file path=ppt/slides/slide21.xml><?xml version="1.0" encoding="utf-8"?>
+<p:sld xmlns:a="http://schemas.openxmlformats.org/drawingml/2006/main" xmlns:r="http://schemas.openxmlformats.org/officeDocument/2006/relationships" xmlns:p="http://schemas.openxmlformats.org/presentationml/2006/main" show="0">
+  <p:cSld>
+    <p:spTree>
+      <p:nvGrpSpPr>
+        <p:cNvPr id="1" name=""/>
+        <p:cNvGrpSpPr/>
+        <p:nvPr/>
+      </p:nvGrpSpPr>
+      <p:grpSpPr>
+        <a:xfrm>
+          <a:off x="0" y="0"/>
+          <a:ext cx="0" cy="0"/>
+          <a:chOff x="0" y="0"/>
+          <a:chExt cx="0" cy="0"/>
+        </a:xfrm>
+      </p:grpSpPr>
+      <p:sp>
+        <p:nvSpPr>
+          <p:cNvPr id="2" name="Title 1">
+            <a:extLst>
+              <a:ext uri="{FF2B5EF4-FFF2-40B4-BE49-F238E27FC236}">
+                <a16:creationId xmlns:a16="http://schemas.microsoft.com/office/drawing/2014/main" id="{5654AA42-1CB2-4AA9-9667-852CA24EEB17}"/>
+              </a:ext>
+            </a:extLst>
+          </p:cNvPr>
+          <p:cNvSpPr>
+            <a:spLocks noGrp="1"/>
+          </p:cNvSpPr>
+          <p:nvPr>
+            <p:ph type="title"/>
+          </p:nvPr>
+        </p:nvSpPr>
+        <p:spPr/>
+        <p:txBody>
+          <a:bodyPr>
+            <a:normAutofit/>
+          </a:bodyPr>
+          <a:lstStyle/>
+          <a:p>
+            <a:pPr algn="l"/>
+            <a:r>
+              <a:rPr lang="en-GB" sz="4400" b="1" dirty="0">
+                <a:solidFill>
+                  <a:schemeClr val="accent3">
+                    <a:lumMod val="75000"/>
+                  </a:schemeClr>
+                </a:solidFill>
+                <a:latin typeface="Bahnschrift SemiCondensed" panose="020B0502040204020203" pitchFamily="34" charset="0"/>
+              </a:rPr>
+              <a:t>Technology</a:t>
+            </a:r>
+            <a:endParaRPr lang="en-AU" sz="4400" b="1" dirty="0">
+              <a:solidFill>
+                <a:schemeClr val="accent3">
+                  <a:lumMod val="75000"/>
+                </a:schemeClr>
+              </a:solidFill>
+              <a:latin typeface="Bahnschrift SemiCondensed" panose="020B0502040204020203" pitchFamily="34" charset="0"/>
+            </a:endParaRPr>
+          </a:p>
+        </p:txBody>
+      </p:sp>
+      <p:sp>
+        <p:nvSpPr>
+          <p:cNvPr id="3" name="Content Placeholder 2">
+            <a:extLst>
+              <a:ext uri="{FF2B5EF4-FFF2-40B4-BE49-F238E27FC236}">
+                <a16:creationId xmlns:a16="http://schemas.microsoft.com/office/drawing/2014/main" id="{F1C7AD93-4D19-40ED-8E9A-21322641B2AA}"/>
+              </a:ext>
+            </a:extLst>
+          </p:cNvPr>
+          <p:cNvSpPr>
+            <a:spLocks noGrp="1"/>
+          </p:cNvSpPr>
+          <p:nvPr>
+            <p:ph idx="1"/>
+          </p:nvPr>
+        </p:nvSpPr>
+        <p:spPr/>
+        <p:txBody>
+          <a:bodyPr>
+            <a:normAutofit/>
+          </a:bodyPr>
+          <a:lstStyle/>
+          <a:p>
+            <a:r>
+              <a:rPr lang="en-GB" sz="1800" dirty="0">
+                <a:latin typeface="Calibri" panose="020F0502020204030204" pitchFamily="34" charset="0"/>
+                <a:cs typeface="Calibri" panose="020F0502020204030204" pitchFamily="34" charset="0"/>
+              </a:rPr>
+              <a:t>Hosted as a webapp using the Django framework</a:t>
+            </a:r>
+          </a:p>
+          <a:p>
+            <a:r>
+              <a:rPr lang="en-GB" sz="1800" dirty="0">
+                <a:latin typeface="Calibri" panose="020F0502020204030204" pitchFamily="34" charset="0"/>
+                <a:cs typeface="Calibri" panose="020F0502020204030204" pitchFamily="34" charset="0"/>
+              </a:rPr>
+              <a:t>Web technologies along with bootstrap and jQuery are used for the webpages and the interactions</a:t>
+            </a:r>
+          </a:p>
+          <a:p>
+            <a:r>
+              <a:rPr lang="en-GB" sz="1800" dirty="0">
+                <a:latin typeface="Calibri" panose="020F0502020204030204" pitchFamily="34" charset="0"/>
+                <a:cs typeface="Calibri" panose="020F0502020204030204" pitchFamily="34" charset="0"/>
+              </a:rPr>
+              <a:t>Algorithm scripts were created using python and various libraries like </a:t>
+            </a:r>
+            <a:r>
+              <a:rPr lang="en-GB" sz="1800" dirty="0" err="1">
+                <a:latin typeface="Calibri" panose="020F0502020204030204" pitchFamily="34" charset="0"/>
+                <a:cs typeface="Calibri" panose="020F0502020204030204" pitchFamily="34" charset="0"/>
+              </a:rPr>
+              <a:t>nltk</a:t>
+            </a:r>
+            <a:r>
+              <a:rPr lang="en-GB" sz="1800" dirty="0">
+                <a:latin typeface="Calibri" panose="020F0502020204030204" pitchFamily="34" charset="0"/>
+                <a:cs typeface="Calibri" panose="020F0502020204030204" pitchFamily="34" charset="0"/>
+              </a:rPr>
+              <a:t>, </a:t>
+            </a:r>
+            <a:r>
+              <a:rPr lang="en-GB" sz="1800" dirty="0" err="1">
+                <a:latin typeface="Calibri" panose="020F0502020204030204" pitchFamily="34" charset="0"/>
+                <a:cs typeface="Calibri" panose="020F0502020204030204" pitchFamily="34" charset="0"/>
+              </a:rPr>
+              <a:t>opencv</a:t>
+            </a:r>
+            <a:r>
+              <a:rPr lang="en-GB" sz="1800" dirty="0">
+                <a:latin typeface="Calibri" panose="020F0502020204030204" pitchFamily="34" charset="0"/>
+                <a:cs typeface="Calibri" panose="020F0502020204030204" pitchFamily="34" charset="0"/>
+              </a:rPr>
+              <a:t> and </a:t>
+            </a:r>
+            <a:r>
+              <a:rPr lang="en-GB" sz="1800" dirty="0" err="1">
+                <a:latin typeface="Calibri" panose="020F0502020204030204" pitchFamily="34" charset="0"/>
+                <a:cs typeface="Calibri" panose="020F0502020204030204" pitchFamily="34" charset="0"/>
+              </a:rPr>
+              <a:t>dlib</a:t>
+            </a:r>
+            <a:endParaRPr lang="en-AU" sz="1800" dirty="0">
+              <a:latin typeface="Calibri" panose="020F0502020204030204" pitchFamily="34" charset="0"/>
+              <a:cs typeface="Calibri" panose="020F0502020204030204" pitchFamily="34" charset="0"/>
+            </a:endParaRPr>
+          </a:p>
+        </p:txBody>
+      </p:sp>
+    </p:spTree>
+    <p:extLst>
+      <p:ext uri="{BB962C8B-B14F-4D97-AF65-F5344CB8AC3E}">
+        <p14:creationId xmlns:p14="http://schemas.microsoft.com/office/powerpoint/2010/main" val="514164503"/>
       </p:ext>
     </p:extLst>
   </p:cSld>
@@ -6710,7 +8330,7 @@
           <p:cNvPr id="2" name="Title 1">
             <a:extLst>
               <a:ext uri="{FF2B5EF4-FFF2-40B4-BE49-F238E27FC236}">
-                <a16:creationId xmlns:a16="http://schemas.microsoft.com/office/drawing/2014/main" id="{5654AA42-1CB2-4AA9-9667-852CA24EEB17}"/>
+                <a16:creationId xmlns:a16="http://schemas.microsoft.com/office/drawing/2014/main" id="{0D01FE68-AF6F-44C7-8F0D-7FF705B40EB9}"/>
               </a:ext>
             </a:extLst>
           </p:cNvPr>
@@ -6723,53 +8343,14 @@
         </p:nvSpPr>
         <p:spPr/>
         <p:txBody>
-          <a:bodyPr>
-            <a:normAutofit/>
-          </a:bodyPr>
-          <a:lstStyle/>
-          <a:p>
-            <a:pPr algn="l"/>
-            <a:r>
-              <a:rPr lang="en-GB" sz="4400" b="1" dirty="0">
-                <a:solidFill>
-                  <a:schemeClr val="accent3">
-                    <a:lumMod val="75000"/>
-                  </a:schemeClr>
-                </a:solidFill>
-                <a:latin typeface="Bahnschrift SemiCondensed" panose="020B0502040204020203" pitchFamily="34" charset="0"/>
-              </a:rPr>
-              <a:t>Feature</a:t>
-            </a:r>
-            <a:r>
-              <a:rPr lang="en-GB" sz="4400" dirty="0">
-                <a:solidFill>
-                  <a:schemeClr val="accent3">
-                    <a:lumMod val="75000"/>
-                  </a:schemeClr>
-                </a:solidFill>
-                <a:latin typeface="Bahnschrift SemiCondensed" panose="020B0502040204020203" pitchFamily="34" charset="0"/>
-              </a:rPr>
-              <a:t> 1 – </a:t>
-            </a:r>
-            <a:r>
-              <a:rPr lang="en-GB" sz="2800" dirty="0">
-                <a:solidFill>
-                  <a:schemeClr val="accent3">
-                    <a:lumMod val="75000"/>
-                  </a:schemeClr>
-                </a:solidFill>
-                <a:latin typeface="Bahnschrift SemiCondensed" panose="020B0502040204020203" pitchFamily="34" charset="0"/>
-              </a:rPr>
-              <a:t>Age and gender detection</a:t>
-            </a:r>
-            <a:endParaRPr lang="en-AU" sz="4400" dirty="0">
-              <a:solidFill>
-                <a:schemeClr val="accent3">
-                  <a:lumMod val="75000"/>
-                </a:schemeClr>
-              </a:solidFill>
-              <a:latin typeface="Bahnschrift SemiCondensed" panose="020B0502040204020203" pitchFamily="34" charset="0"/>
-            </a:endParaRPr>
+          <a:bodyPr/>
+          <a:lstStyle/>
+          <a:p>
+            <a:r>
+              <a:rPr lang="en-US" dirty="0"/>
+              <a:t>DATA</a:t>
+            </a:r>
+            <a:endParaRPr lang="en-AU" dirty="0"/>
           </a:p>
         </p:txBody>
       </p:sp>
@@ -6778,7 +8359,7 @@
           <p:cNvPr id="3" name="Content Placeholder 2">
             <a:extLst>
               <a:ext uri="{FF2B5EF4-FFF2-40B4-BE49-F238E27FC236}">
-                <a16:creationId xmlns:a16="http://schemas.microsoft.com/office/drawing/2014/main" id="{F1C7AD93-4D19-40ED-8E9A-21322641B2AA}"/>
+                <a16:creationId xmlns:a16="http://schemas.microsoft.com/office/drawing/2014/main" id="{86D2D979-FE4E-464B-A13B-E1E550E192E8}"/>
               </a:ext>
             </a:extLst>
           </p:cNvPr>
@@ -6786,151 +8367,59 @@
             <a:spLocks noGrp="1"/>
           </p:cNvSpPr>
           <p:nvPr>
-            <p:ph idx="1"/>
+            <p:ph sz="quarter" idx="13"/>
           </p:nvPr>
         </p:nvSpPr>
         <p:spPr/>
         <p:txBody>
-          <a:bodyPr>
-            <a:normAutofit lnSpcReduction="10000"/>
-          </a:bodyPr>
-          <a:lstStyle/>
-          <a:p>
-            <a:r>
-              <a:rPr lang="en-GB" sz="1800" dirty="0">
-                <a:latin typeface="Calibri" panose="020F0502020204030204" pitchFamily="34" charset="0"/>
-                <a:cs typeface="Calibri" panose="020F0502020204030204" pitchFamily="34" charset="0"/>
-              </a:rPr>
-              <a:t>Detecting age and gender from an image</a:t>
-            </a:r>
-          </a:p>
-          <a:p>
-            <a:r>
-              <a:rPr lang="en-GB" sz="1800" dirty="0">
-                <a:latin typeface="Calibri" panose="020F0502020204030204" pitchFamily="34" charset="0"/>
-                <a:cs typeface="Calibri" panose="020F0502020204030204" pitchFamily="34" charset="0"/>
-              </a:rPr>
-              <a:t>An image of a person can be uploaded and the final output is image with the persons age and gender written on it</a:t>
-            </a:r>
-          </a:p>
-          <a:p>
-            <a:r>
-              <a:rPr lang="en-GB" sz="1800" dirty="0">
-                <a:latin typeface="Calibri" panose="020F0502020204030204" pitchFamily="34" charset="0"/>
-                <a:cs typeface="Calibri" panose="020F0502020204030204" pitchFamily="34" charset="0"/>
-              </a:rPr>
-              <a:t>Four blocks, each has its own output</a:t>
-            </a:r>
-          </a:p>
-          <a:p>
-            <a:pPr marL="800100" lvl="1" indent="-342900">
-              <a:buFont typeface="+mj-lt"/>
-              <a:buAutoNum type="arabicPeriod"/>
-            </a:pPr>
-            <a:r>
-              <a:rPr lang="en-GB" sz="1600" dirty="0">
-                <a:latin typeface="Calibri" panose="020F0502020204030204" pitchFamily="34" charset="0"/>
-                <a:cs typeface="Calibri" panose="020F0502020204030204" pitchFamily="34" charset="0"/>
-              </a:rPr>
-              <a:t>Face detection – an output image with a square highlighting the face</a:t>
-            </a:r>
-          </a:p>
-          <a:p>
-            <a:pPr marL="800100" lvl="1" indent="-342900">
-              <a:buFont typeface="+mj-lt"/>
-              <a:buAutoNum type="arabicPeriod"/>
-            </a:pPr>
-            <a:r>
-              <a:rPr lang="en-GB" sz="1600" dirty="0">
-                <a:latin typeface="Calibri" panose="020F0502020204030204" pitchFamily="34" charset="0"/>
-                <a:cs typeface="Calibri" panose="020F0502020204030204" pitchFamily="34" charset="0"/>
-              </a:rPr>
-              <a:t>Feature detection – detects the facial features and highlights them using points</a:t>
-            </a:r>
-          </a:p>
-          <a:p>
-            <a:pPr marL="800100" lvl="1" indent="-342900">
-              <a:buFont typeface="+mj-lt"/>
-              <a:buAutoNum type="arabicPeriod"/>
-            </a:pPr>
-            <a:r>
-              <a:rPr lang="en-GB" sz="1600" dirty="0">
-                <a:latin typeface="Calibri" panose="020F0502020204030204" pitchFamily="34" charset="0"/>
-                <a:cs typeface="Calibri" panose="020F0502020204030204" pitchFamily="34" charset="0"/>
-              </a:rPr>
-              <a:t>Age detection – detects and writes the age range of the person</a:t>
-            </a:r>
-          </a:p>
-          <a:p>
-            <a:pPr marL="800100" lvl="1" indent="-342900">
-              <a:buFont typeface="+mj-lt"/>
-              <a:buAutoNum type="arabicPeriod"/>
-            </a:pPr>
-            <a:r>
-              <a:rPr lang="en-GB" sz="1600" dirty="0">
-                <a:latin typeface="Calibri" panose="020F0502020204030204" pitchFamily="34" charset="0"/>
-                <a:cs typeface="Calibri" panose="020F0502020204030204" pitchFamily="34" charset="0"/>
-              </a:rPr>
-              <a:t>Gender detection - detects and writes the gender of the person</a:t>
-            </a:r>
-            <a:endParaRPr lang="en-AU" sz="1600" dirty="0">
-              <a:latin typeface="Calibri" panose="020F0502020204030204" pitchFamily="34" charset="0"/>
-              <a:cs typeface="Calibri" panose="020F0502020204030204" pitchFamily="34" charset="0"/>
-            </a:endParaRPr>
-          </a:p>
-          <a:p>
-            <a:r>
-              <a:rPr lang="en-GB" dirty="0">
-                <a:latin typeface="Calibri" panose="020F0502020204030204" pitchFamily="34" charset="0"/>
-                <a:cs typeface="Calibri" panose="020F0502020204030204" pitchFamily="34" charset="0"/>
-              </a:rPr>
-              <a:t>The blocks have to dragged on in the order ( face </a:t>
-            </a:r>
-            <a:r>
-              <a:rPr lang="en-GB" dirty="0">
-                <a:solidFill>
-                  <a:srgbClr val="C00000"/>
-                </a:solidFill>
-                <a:latin typeface="Calibri" panose="020F0502020204030204" pitchFamily="34" charset="0"/>
-                <a:cs typeface="Calibri" panose="020F0502020204030204" pitchFamily="34" charset="0"/>
-              </a:rPr>
-              <a:t>-&gt;</a:t>
-            </a:r>
-            <a:r>
-              <a:rPr lang="en-GB" dirty="0">
-                <a:latin typeface="Calibri" panose="020F0502020204030204" pitchFamily="34" charset="0"/>
-                <a:cs typeface="Calibri" panose="020F0502020204030204" pitchFamily="34" charset="0"/>
-              </a:rPr>
-              <a:t> feature </a:t>
-            </a:r>
-            <a:r>
-              <a:rPr lang="en-GB" dirty="0">
-                <a:solidFill>
-                  <a:srgbClr val="C00000"/>
-                </a:solidFill>
-                <a:latin typeface="Calibri" panose="020F0502020204030204" pitchFamily="34" charset="0"/>
-                <a:cs typeface="Calibri" panose="020F0502020204030204" pitchFamily="34" charset="0"/>
-              </a:rPr>
-              <a:t>-&gt;</a:t>
-            </a:r>
-            <a:r>
-              <a:rPr lang="en-GB" dirty="0">
-                <a:latin typeface="Calibri" panose="020F0502020204030204" pitchFamily="34" charset="0"/>
-                <a:cs typeface="Calibri" panose="020F0502020204030204" pitchFamily="34" charset="0"/>
-              </a:rPr>
-              <a:t> age/gender)</a:t>
-            </a:r>
-            <a:endParaRPr lang="en-AU" dirty="0">
-              <a:latin typeface="Calibri" panose="020F0502020204030204" pitchFamily="34" charset="0"/>
-              <a:cs typeface="Calibri" panose="020F0502020204030204" pitchFamily="34" charset="0"/>
-            </a:endParaRPr>
+          <a:bodyPr/>
+          <a:lstStyle/>
+          <a:p>
+            <a:r>
+              <a:rPr lang="en-US" dirty="0"/>
+              <a:t>Data is everywhere</a:t>
+            </a:r>
+          </a:p>
+          <a:p>
+            <a:r>
+              <a:rPr lang="en-US" dirty="0"/>
+              <a:t>All of us generate data</a:t>
+            </a:r>
+          </a:p>
+          <a:p>
+            <a:r>
+              <a:rPr lang="en-US" dirty="0"/>
+              <a:t>Can be used for numerous applications:</a:t>
+            </a:r>
+          </a:p>
+          <a:p>
+            <a:pPr lvl="1"/>
+            <a:r>
+              <a:rPr lang="en-US" dirty="0"/>
+              <a:t>Recommendation</a:t>
+            </a:r>
+          </a:p>
+          <a:p>
+            <a:pPr lvl="1"/>
+            <a:r>
+              <a:rPr lang="en-US" dirty="0"/>
+              <a:t>Prediction, </a:t>
+            </a:r>
+            <a:r>
+              <a:rPr lang="en-US" dirty="0" err="1"/>
+              <a:t>etc</a:t>
+            </a:r>
+            <a:endParaRPr lang="en-US" dirty="0"/>
+          </a:p>
+          <a:p>
+            <a:endParaRPr lang="en-AU" dirty="0"/>
           </a:p>
         </p:txBody>
       </p:sp>
     </p:spTree>
     <p:extLst>
       <p:ext uri="{BB962C8B-B14F-4D97-AF65-F5344CB8AC3E}">
-        <p14:creationId xmlns:p14="http://schemas.microsoft.com/office/powerpoint/2010/main" val="1029014537"/>
+        <p14:creationId xmlns:p14="http://schemas.microsoft.com/office/powerpoint/2010/main" val="2821169179"/>
       </p:ext>
     </p:extLst>
   </p:cSld>
@@ -6962,7 +8451,7 @@
           <p:cNvPr id="2" name="Title 1">
             <a:extLst>
               <a:ext uri="{FF2B5EF4-FFF2-40B4-BE49-F238E27FC236}">
-                <a16:creationId xmlns:a16="http://schemas.microsoft.com/office/drawing/2014/main" id="{5654AA42-1CB2-4AA9-9667-852CA24EEB17}"/>
+                <a16:creationId xmlns:a16="http://schemas.microsoft.com/office/drawing/2014/main" id="{2FCEBD55-EA0A-4B0C-8308-CF404FB2BD67}"/>
               </a:ext>
             </a:extLst>
           </p:cNvPr>
@@ -6975,42 +8464,13 @@
         </p:nvSpPr>
         <p:spPr/>
         <p:txBody>
-          <a:bodyPr>
-            <a:normAutofit/>
-          </a:bodyPr>
-          <a:lstStyle/>
-          <a:p>
-            <a:pPr algn="l"/>
-            <a:r>
-              <a:rPr lang="en-GB" sz="4400" b="1" dirty="0">
-                <a:solidFill>
-                  <a:schemeClr val="accent3">
-                    <a:lumMod val="75000"/>
-                  </a:schemeClr>
-                </a:solidFill>
-                <a:latin typeface="Bahnschrift SemiCondensed" panose="020B0502040204020203" pitchFamily="34" charset="0"/>
-              </a:rPr>
-              <a:t>Feature 2 – </a:t>
-            </a:r>
-            <a:r>
-              <a:rPr lang="en-GB" sz="2800" dirty="0">
-                <a:solidFill>
-                  <a:schemeClr val="accent3">
-                    <a:lumMod val="75000"/>
-                  </a:schemeClr>
-                </a:solidFill>
-                <a:latin typeface="Bahnschrift SemiCondensed" panose="020B0502040204020203" pitchFamily="34" charset="0"/>
-              </a:rPr>
-              <a:t>sentiment analysis</a:t>
-            </a:r>
-            <a:endParaRPr lang="en-AU" sz="4400" b="1" dirty="0">
-              <a:solidFill>
-                <a:schemeClr val="accent3">
-                  <a:lumMod val="75000"/>
-                </a:schemeClr>
-              </a:solidFill>
-              <a:latin typeface="Bahnschrift SemiCondensed" panose="020B0502040204020203" pitchFamily="34" charset="0"/>
-            </a:endParaRPr>
+          <a:bodyPr/>
+          <a:lstStyle/>
+          <a:p>
+            <a:r>
+              <a:rPr lang="en-AU" dirty="0"/>
+              <a:t>ML/AI</a:t>
+            </a:r>
           </a:p>
         </p:txBody>
       </p:sp>
@@ -7019,7 +8479,7 @@
           <p:cNvPr id="3" name="Content Placeholder 2">
             <a:extLst>
               <a:ext uri="{FF2B5EF4-FFF2-40B4-BE49-F238E27FC236}">
-                <a16:creationId xmlns:a16="http://schemas.microsoft.com/office/drawing/2014/main" id="{F1C7AD93-4D19-40ED-8E9A-21322641B2AA}"/>
+                <a16:creationId xmlns:a16="http://schemas.microsoft.com/office/drawing/2014/main" id="{E44570BE-52CA-4D2E-A046-2F88EFE3FB2F}"/>
               </a:ext>
             </a:extLst>
           </p:cNvPr>
@@ -7027,160 +8487,54 @@
             <a:spLocks noGrp="1"/>
           </p:cNvSpPr>
           <p:nvPr>
-            <p:ph idx="1"/>
+            <p:ph sz="quarter" idx="13"/>
           </p:nvPr>
         </p:nvSpPr>
         <p:spPr/>
         <p:txBody>
-          <a:bodyPr>
-            <a:normAutofit lnSpcReduction="10000"/>
-          </a:bodyPr>
-          <a:lstStyle/>
-          <a:p>
-            <a:r>
-              <a:rPr lang="en-GB" sz="1800" dirty="0">
-                <a:latin typeface="Calibri" panose="020F0502020204030204" pitchFamily="34" charset="0"/>
-                <a:cs typeface="Calibri" panose="020F0502020204030204" pitchFamily="34" charset="0"/>
-              </a:rPr>
-              <a:t>Detecting the sentiment of a sentence or tweet</a:t>
-            </a:r>
-          </a:p>
-          <a:p>
-            <a:r>
-              <a:rPr lang="en-AU" sz="1800" dirty="0">
-                <a:latin typeface="Calibri" panose="020F0502020204030204" pitchFamily="34" charset="0"/>
-                <a:cs typeface="Calibri" panose="020F0502020204030204" pitchFamily="34" charset="0"/>
-              </a:rPr>
-              <a:t>A random tweet can be generated or a sentence can be typed, and machine will identify if the sentiment of it happy or sad</a:t>
-            </a:r>
-          </a:p>
-          <a:p>
-            <a:r>
-              <a:rPr lang="en-AU" sz="1800" dirty="0">
-                <a:latin typeface="Calibri" panose="020F0502020204030204" pitchFamily="34" charset="0"/>
-                <a:cs typeface="Calibri" panose="020F0502020204030204" pitchFamily="34" charset="0"/>
-              </a:rPr>
-              <a:t>Four blocks</a:t>
-            </a:r>
-          </a:p>
-          <a:p>
-            <a:pPr marL="800100" lvl="1" indent="-342900">
-              <a:buFont typeface="+mj-lt"/>
-              <a:buAutoNum type="arabicPeriod"/>
-            </a:pPr>
-            <a:r>
-              <a:rPr lang="en-AU" sz="1600" dirty="0">
-                <a:latin typeface="Calibri" panose="020F0502020204030204" pitchFamily="34" charset="0"/>
-                <a:cs typeface="Calibri" panose="020F0502020204030204" pitchFamily="34" charset="0"/>
-              </a:rPr>
-              <a:t>Tokenization – converts the sentence into tokens and displays them</a:t>
-            </a:r>
-          </a:p>
-          <a:p>
-            <a:pPr marL="800100" lvl="1" indent="-342900">
-              <a:buFont typeface="+mj-lt"/>
-              <a:buAutoNum type="arabicPeriod"/>
-            </a:pPr>
-            <a:r>
-              <a:rPr lang="en-AU" sz="1600" dirty="0">
-                <a:latin typeface="Calibri" panose="020F0502020204030204" pitchFamily="34" charset="0"/>
-                <a:cs typeface="Calibri" panose="020F0502020204030204" pitchFamily="34" charset="0"/>
-              </a:rPr>
-              <a:t>Stemming – identify and display on the root words of all tokens</a:t>
-            </a:r>
-          </a:p>
-          <a:p>
-            <a:pPr marL="800100" lvl="1" indent="-342900">
-              <a:buFont typeface="+mj-lt"/>
-              <a:buAutoNum type="arabicPeriod"/>
-            </a:pPr>
-            <a:r>
-              <a:rPr lang="en-AU" sz="1600" dirty="0">
-                <a:latin typeface="Calibri" panose="020F0502020204030204" pitchFamily="34" charset="0"/>
-                <a:cs typeface="Calibri" panose="020F0502020204030204" pitchFamily="34" charset="0"/>
-              </a:rPr>
-              <a:t>Stop word removal – remove all stop words and display the rest</a:t>
-            </a:r>
-          </a:p>
-          <a:p>
-            <a:pPr marL="800100" lvl="1" indent="-342900">
-              <a:buFont typeface="+mj-lt"/>
-              <a:buAutoNum type="arabicPeriod"/>
-            </a:pPr>
-            <a:r>
-              <a:rPr lang="en-AU" sz="1600" dirty="0">
-                <a:latin typeface="Calibri" panose="020F0502020204030204" pitchFamily="34" charset="0"/>
-                <a:cs typeface="Calibri" panose="020F0502020204030204" pitchFamily="34" charset="0"/>
-              </a:rPr>
-              <a:t>Detect sentiment – display if the sentiment is happy or sad.</a:t>
-            </a:r>
-          </a:p>
-          <a:p>
-            <a:r>
-              <a:rPr lang="en-AU" sz="1800" dirty="0">
-                <a:latin typeface="Calibri" panose="020F0502020204030204" pitchFamily="34" charset="0"/>
-                <a:cs typeface="Calibri" panose="020F0502020204030204" pitchFamily="34" charset="0"/>
-              </a:rPr>
-              <a:t>The order of the blocks is; tokenization</a:t>
-            </a:r>
-            <a:r>
-              <a:rPr lang="en-AU" sz="1800" dirty="0">
-                <a:solidFill>
-                  <a:srgbClr val="C00000"/>
-                </a:solidFill>
-                <a:latin typeface="Calibri" panose="020F0502020204030204" pitchFamily="34" charset="0"/>
-                <a:cs typeface="Calibri" panose="020F0502020204030204" pitchFamily="34" charset="0"/>
-              </a:rPr>
-              <a:t> -&gt; </a:t>
-            </a:r>
-            <a:r>
-              <a:rPr lang="en-AU" sz="1800" dirty="0">
-                <a:latin typeface="Calibri" panose="020F0502020204030204" pitchFamily="34" charset="0"/>
-                <a:cs typeface="Calibri" panose="020F0502020204030204" pitchFamily="34" charset="0"/>
-              </a:rPr>
-              <a:t>stemming </a:t>
-            </a:r>
-            <a:r>
-              <a:rPr lang="en-AU" sz="1800" dirty="0">
-                <a:solidFill>
-                  <a:srgbClr val="C00000"/>
-                </a:solidFill>
-                <a:latin typeface="Calibri" panose="020F0502020204030204" pitchFamily="34" charset="0"/>
-                <a:cs typeface="Calibri" panose="020F0502020204030204" pitchFamily="34" charset="0"/>
-              </a:rPr>
-              <a:t>-&gt;</a:t>
-            </a:r>
-            <a:r>
-              <a:rPr lang="en-AU" sz="1800" dirty="0">
-                <a:latin typeface="Calibri" panose="020F0502020204030204" pitchFamily="34" charset="0"/>
-                <a:cs typeface="Calibri" panose="020F0502020204030204" pitchFamily="34" charset="0"/>
-              </a:rPr>
-              <a:t> stop words </a:t>
-            </a:r>
-            <a:r>
-              <a:rPr lang="en-AU" sz="1800" dirty="0">
-                <a:solidFill>
-                  <a:srgbClr val="C00000"/>
-                </a:solidFill>
-                <a:latin typeface="Calibri" panose="020F0502020204030204" pitchFamily="34" charset="0"/>
-                <a:cs typeface="Calibri" panose="020F0502020204030204" pitchFamily="34" charset="0"/>
-              </a:rPr>
-              <a:t>-&gt;</a:t>
-            </a:r>
-            <a:r>
-              <a:rPr lang="en-AU" sz="1800" dirty="0">
-                <a:latin typeface="Calibri" panose="020F0502020204030204" pitchFamily="34" charset="0"/>
-                <a:cs typeface="Calibri" panose="020F0502020204030204" pitchFamily="34" charset="0"/>
-              </a:rPr>
-              <a:t> sentiment</a:t>
-            </a:r>
+          <a:bodyPr/>
+          <a:lstStyle/>
+          <a:p>
+            <a:r>
+              <a:rPr lang="en-AU" dirty="0"/>
+              <a:t>AI is branch of science that creates intelligent machines</a:t>
+            </a:r>
+          </a:p>
+          <a:p>
+            <a:r>
+              <a:rPr lang="en-AU" dirty="0"/>
+              <a:t>Uses data and machine learning to make machines think like humans</a:t>
+            </a:r>
+          </a:p>
+          <a:p>
+            <a:r>
+              <a:rPr lang="en-AU" dirty="0"/>
+              <a:t>Example:</a:t>
+            </a:r>
+          </a:p>
+          <a:p>
+            <a:pPr lvl="1"/>
+            <a:r>
+              <a:rPr lang="en-AU" dirty="0"/>
+              <a:t>Machine can identify humans and others objects from image, just like we can.</a:t>
+            </a:r>
+          </a:p>
+          <a:p>
+            <a:pPr lvl="1"/>
+            <a:r>
+              <a:rPr lang="en-AU" dirty="0"/>
+              <a:t>Machine can understand emotions behind sentences, just like us.</a:t>
+            </a:r>
+          </a:p>
+          <a:p>
+            <a:endParaRPr lang="en-AU" dirty="0"/>
           </a:p>
         </p:txBody>
       </p:sp>
     </p:spTree>
     <p:extLst>
       <p:ext uri="{BB962C8B-B14F-4D97-AF65-F5344CB8AC3E}">
-        <p14:creationId xmlns:p14="http://schemas.microsoft.com/office/powerpoint/2010/main" val="1766342802"/>
+        <p14:creationId xmlns:p14="http://schemas.microsoft.com/office/powerpoint/2010/main" val="1990608917"/>
       </p:ext>
     </p:extLst>
   </p:cSld>
@@ -7212,7 +8566,7 @@
           <p:cNvPr id="2" name="Title 1">
             <a:extLst>
               <a:ext uri="{FF2B5EF4-FFF2-40B4-BE49-F238E27FC236}">
-                <a16:creationId xmlns:a16="http://schemas.microsoft.com/office/drawing/2014/main" id="{5654AA42-1CB2-4AA9-9667-852CA24EEB17}"/>
+                <a16:creationId xmlns:a16="http://schemas.microsoft.com/office/drawing/2014/main" id="{736562F8-4E8B-4CEB-A6A4-F7268424D695}"/>
               </a:ext>
             </a:extLst>
           </p:cNvPr>
@@ -7225,31 +8579,13 @@
         </p:nvSpPr>
         <p:spPr/>
         <p:txBody>
-          <a:bodyPr>
-            <a:normAutofit/>
-          </a:bodyPr>
-          <a:lstStyle/>
-          <a:p>
-            <a:pPr algn="l"/>
-            <a:r>
-              <a:rPr lang="en-GB" sz="4400" b="1" dirty="0">
-                <a:solidFill>
-                  <a:schemeClr val="accent3">
-                    <a:lumMod val="75000"/>
-                  </a:schemeClr>
-                </a:solidFill>
-                <a:latin typeface="Bahnschrift SemiCondensed" panose="020B0502040204020203" pitchFamily="34" charset="0"/>
-              </a:rPr>
-              <a:t>Technology</a:t>
-            </a:r>
-            <a:endParaRPr lang="en-AU" sz="4400" b="1" dirty="0">
-              <a:solidFill>
-                <a:schemeClr val="accent3">
-                  <a:lumMod val="75000"/>
-                </a:schemeClr>
-              </a:solidFill>
-              <a:latin typeface="Bahnschrift SemiCondensed" panose="020B0502040204020203" pitchFamily="34" charset="0"/>
-            </a:endParaRPr>
+          <a:bodyPr/>
+          <a:lstStyle/>
+          <a:p>
+            <a:r>
+              <a:rPr lang="en-AU" dirty="0"/>
+              <a:t>Why to learn?</a:t>
+            </a:r>
           </a:p>
         </p:txBody>
       </p:sp>
@@ -7258,7 +8594,7 @@
           <p:cNvPr id="3" name="Content Placeholder 2">
             <a:extLst>
               <a:ext uri="{FF2B5EF4-FFF2-40B4-BE49-F238E27FC236}">
-                <a16:creationId xmlns:a16="http://schemas.microsoft.com/office/drawing/2014/main" id="{F1C7AD93-4D19-40ED-8E9A-21322641B2AA}"/>
+                <a16:creationId xmlns:a16="http://schemas.microsoft.com/office/drawing/2014/main" id="{D50C8631-A597-4875-BEC4-720508AA227F}"/>
               </a:ext>
             </a:extLst>
           </p:cNvPr>
@@ -7266,87 +8602,43 @@
             <a:spLocks noGrp="1"/>
           </p:cNvSpPr>
           <p:nvPr>
-            <p:ph idx="1"/>
+            <p:ph sz="quarter" idx="13"/>
           </p:nvPr>
         </p:nvSpPr>
         <p:spPr/>
         <p:txBody>
-          <a:bodyPr>
-            <a:normAutofit/>
-          </a:bodyPr>
-          <a:lstStyle/>
-          <a:p>
-            <a:r>
-              <a:rPr lang="en-GB" sz="1800" dirty="0">
-                <a:latin typeface="Calibri" panose="020F0502020204030204" pitchFamily="34" charset="0"/>
-                <a:cs typeface="Calibri" panose="020F0502020204030204" pitchFamily="34" charset="0"/>
-              </a:rPr>
-              <a:t>Hosted as a webapp using the Django framework</a:t>
-            </a:r>
-          </a:p>
-          <a:p>
-            <a:r>
-              <a:rPr lang="en-GB" sz="1800" dirty="0">
-                <a:latin typeface="Calibri" panose="020F0502020204030204" pitchFamily="34" charset="0"/>
-                <a:cs typeface="Calibri" panose="020F0502020204030204" pitchFamily="34" charset="0"/>
-              </a:rPr>
-              <a:t>Web technologies along with bootstrap and jQuery are used for the webpages and the interactions</a:t>
-            </a:r>
-          </a:p>
-          <a:p>
-            <a:r>
-              <a:rPr lang="en-GB" sz="1800" dirty="0">
-                <a:latin typeface="Calibri" panose="020F0502020204030204" pitchFamily="34" charset="0"/>
-                <a:cs typeface="Calibri" panose="020F0502020204030204" pitchFamily="34" charset="0"/>
-              </a:rPr>
-              <a:t>Algorithm scripts were created using python and various libraries like </a:t>
-            </a:r>
-            <a:r>
-              <a:rPr lang="en-GB" sz="1800" dirty="0" err="1">
-                <a:latin typeface="Calibri" panose="020F0502020204030204" pitchFamily="34" charset="0"/>
-                <a:cs typeface="Calibri" panose="020F0502020204030204" pitchFamily="34" charset="0"/>
-              </a:rPr>
-              <a:t>nltk</a:t>
-            </a:r>
-            <a:r>
-              <a:rPr lang="en-GB" sz="1800" dirty="0">
-                <a:latin typeface="Calibri" panose="020F0502020204030204" pitchFamily="34" charset="0"/>
-                <a:cs typeface="Calibri" panose="020F0502020204030204" pitchFamily="34" charset="0"/>
-              </a:rPr>
-              <a:t>, </a:t>
-            </a:r>
-            <a:r>
-              <a:rPr lang="en-GB" sz="1800" dirty="0" err="1">
-                <a:latin typeface="Calibri" panose="020F0502020204030204" pitchFamily="34" charset="0"/>
-                <a:cs typeface="Calibri" panose="020F0502020204030204" pitchFamily="34" charset="0"/>
-              </a:rPr>
-              <a:t>opencv</a:t>
-            </a:r>
-            <a:r>
-              <a:rPr lang="en-GB" sz="1800" dirty="0">
-                <a:latin typeface="Calibri" panose="020F0502020204030204" pitchFamily="34" charset="0"/>
-                <a:cs typeface="Calibri" panose="020F0502020204030204" pitchFamily="34" charset="0"/>
-              </a:rPr>
-              <a:t> and </a:t>
-            </a:r>
-            <a:r>
-              <a:rPr lang="en-GB" sz="1800" dirty="0" err="1">
-                <a:latin typeface="Calibri" panose="020F0502020204030204" pitchFamily="34" charset="0"/>
-                <a:cs typeface="Calibri" panose="020F0502020204030204" pitchFamily="34" charset="0"/>
-              </a:rPr>
-              <a:t>dlib</a:t>
-            </a:r>
-            <a:endParaRPr lang="en-AU" sz="1800" dirty="0">
-              <a:latin typeface="Calibri" panose="020F0502020204030204" pitchFamily="34" charset="0"/>
-              <a:cs typeface="Calibri" panose="020F0502020204030204" pitchFamily="34" charset="0"/>
-            </a:endParaRPr>
+          <a:bodyPr/>
+          <a:lstStyle/>
+          <a:p>
+            <a:r>
+              <a:rPr lang="en-AU" dirty="0"/>
+              <a:t>Ai/ml constantly getting used by corporations</a:t>
+            </a:r>
+          </a:p>
+          <a:p>
+            <a:r>
+              <a:rPr lang="en-AU" dirty="0"/>
+              <a:t>Machines are getting smarter every day</a:t>
+            </a:r>
+          </a:p>
+          <a:p>
+            <a:r>
+              <a:rPr lang="en-AU" dirty="0"/>
+              <a:t>Important to understand these concepts early on</a:t>
+            </a:r>
+          </a:p>
+          <a:p>
+            <a:r>
+              <a:rPr lang="en-AU" dirty="0"/>
+              <a:t>Enable kids to use their innovative mind and power of ai to create wonders!</a:t>
+            </a:r>
           </a:p>
         </p:txBody>
       </p:sp>
     </p:spTree>
     <p:extLst>
       <p:ext uri="{BB962C8B-B14F-4D97-AF65-F5344CB8AC3E}">
-        <p14:creationId xmlns:p14="http://schemas.microsoft.com/office/powerpoint/2010/main" val="514164503"/>
+        <p14:creationId xmlns:p14="http://schemas.microsoft.com/office/powerpoint/2010/main" val="2517995375"/>
       </p:ext>
     </p:extLst>
   </p:cSld>
@@ -7378,7 +8670,7 @@
           <p:cNvPr id="2" name="Title 1">
             <a:extLst>
               <a:ext uri="{FF2B5EF4-FFF2-40B4-BE49-F238E27FC236}">
-                <a16:creationId xmlns:a16="http://schemas.microsoft.com/office/drawing/2014/main" id="{5654AA42-1CB2-4AA9-9667-852CA24EEB17}"/>
+                <a16:creationId xmlns:a16="http://schemas.microsoft.com/office/drawing/2014/main" id="{E6CAF5EB-9BB7-4336-BFA0-125E1CE4951A}"/>
               </a:ext>
             </a:extLst>
           </p:cNvPr>
@@ -7391,31 +8683,13 @@
         </p:nvSpPr>
         <p:spPr/>
         <p:txBody>
-          <a:bodyPr>
-            <a:normAutofit/>
-          </a:bodyPr>
-          <a:lstStyle/>
-          <a:p>
-            <a:pPr algn="l"/>
-            <a:r>
-              <a:rPr lang="en-GB" sz="4400" b="1" dirty="0">
-                <a:solidFill>
-                  <a:schemeClr val="accent3">
-                    <a:lumMod val="75000"/>
-                  </a:schemeClr>
-                </a:solidFill>
-                <a:latin typeface="Bahnschrift SemiCondensed" panose="020B0502040204020203" pitchFamily="34" charset="0"/>
-              </a:rPr>
-              <a:t>What’s next</a:t>
-            </a:r>
-            <a:endParaRPr lang="en-AU" sz="4400" b="1" dirty="0">
-              <a:solidFill>
-                <a:schemeClr val="accent3">
-                  <a:lumMod val="75000"/>
-                </a:schemeClr>
-              </a:solidFill>
-              <a:latin typeface="Bahnschrift SemiCondensed" panose="020B0502040204020203" pitchFamily="34" charset="0"/>
-            </a:endParaRPr>
+          <a:bodyPr/>
+          <a:lstStyle/>
+          <a:p>
+            <a:r>
+              <a:rPr lang="en-AU" dirty="0"/>
+              <a:t>Problem?</a:t>
+            </a:r>
           </a:p>
         </p:txBody>
       </p:sp>
@@ -7424,7 +8698,7 @@
           <p:cNvPr id="3" name="Content Placeholder 2">
             <a:extLst>
               <a:ext uri="{FF2B5EF4-FFF2-40B4-BE49-F238E27FC236}">
-                <a16:creationId xmlns:a16="http://schemas.microsoft.com/office/drawing/2014/main" id="{F1C7AD93-4D19-40ED-8E9A-21322641B2AA}"/>
+                <a16:creationId xmlns:a16="http://schemas.microsoft.com/office/drawing/2014/main" id="{5A559305-C076-4B21-8F50-9BC99068823D}"/>
               </a:ext>
             </a:extLst>
           </p:cNvPr>
@@ -7432,61 +8706,43 @@
             <a:spLocks noGrp="1"/>
           </p:cNvSpPr>
           <p:nvPr>
-            <p:ph idx="1"/>
+            <p:ph sz="quarter" idx="13"/>
           </p:nvPr>
         </p:nvSpPr>
         <p:spPr/>
         <p:txBody>
-          <a:bodyPr>
-            <a:normAutofit/>
-          </a:bodyPr>
-          <a:lstStyle/>
-          <a:p>
-            <a:r>
-              <a:rPr lang="en-GB" sz="1800" dirty="0">
-                <a:latin typeface="Calibri" panose="020F0502020204030204" pitchFamily="34" charset="0"/>
-                <a:cs typeface="Calibri" panose="020F0502020204030204" pitchFamily="34" charset="0"/>
-              </a:rPr>
-              <a:t>Improve the aesthetics and interactions to make it more child friendly</a:t>
-            </a:r>
-          </a:p>
-          <a:p>
-            <a:r>
-              <a:rPr lang="en-GB" sz="1800" dirty="0">
-                <a:latin typeface="Calibri" panose="020F0502020204030204" pitchFamily="34" charset="0"/>
-                <a:cs typeface="Calibri" panose="020F0502020204030204" pitchFamily="34" charset="0"/>
-              </a:rPr>
-              <a:t>Improve the examples by setting difficulty levels like novice, intermediate and expert.</a:t>
-            </a:r>
-          </a:p>
-          <a:p>
-            <a:r>
-              <a:rPr lang="en-GB" sz="1800" dirty="0">
-                <a:latin typeface="Calibri" panose="020F0502020204030204" pitchFamily="34" charset="0"/>
-                <a:cs typeface="Calibri" panose="020F0502020204030204" pitchFamily="34" charset="0"/>
-              </a:rPr>
-              <a:t>Implement more example concepts, games and other imaginative ideas to peak the interest of kids</a:t>
-            </a:r>
-          </a:p>
-          <a:p>
-            <a:r>
-              <a:rPr lang="en-GB" sz="1800" dirty="0">
-                <a:latin typeface="Calibri" panose="020F0502020204030204" pitchFamily="34" charset="0"/>
-                <a:cs typeface="Calibri" panose="020F0502020204030204" pitchFamily="34" charset="0"/>
-              </a:rPr>
-              <a:t>Set up a user login system</a:t>
-            </a:r>
-            <a:endParaRPr lang="en-AU" sz="1800" dirty="0">
-              <a:latin typeface="Calibri" panose="020F0502020204030204" pitchFamily="34" charset="0"/>
-              <a:cs typeface="Calibri" panose="020F0502020204030204" pitchFamily="34" charset="0"/>
-            </a:endParaRPr>
+          <a:bodyPr/>
+          <a:lstStyle/>
+          <a:p>
+            <a:r>
+              <a:rPr lang="en-AU" dirty="0"/>
+              <a:t>Ai/ml are complex concepts</a:t>
+            </a:r>
+          </a:p>
+          <a:p>
+            <a:r>
+              <a:rPr lang="en-AU" dirty="0"/>
+              <a:t>Kids don’t have much time because of schooling and other activities</a:t>
+            </a:r>
+          </a:p>
+          <a:p>
+            <a:r>
+              <a:rPr lang="en-AU" dirty="0"/>
+              <a:t>Important to retain kids attention while teaching complex task</a:t>
+            </a:r>
+          </a:p>
+          <a:p>
+            <a:r>
+              <a:rPr lang="en-AU" dirty="0"/>
+              <a:t>Kids should understand how each concept is working</a:t>
+            </a:r>
           </a:p>
         </p:txBody>
       </p:sp>
     </p:spTree>
     <p:extLst>
       <p:ext uri="{BB962C8B-B14F-4D97-AF65-F5344CB8AC3E}">
-        <p14:creationId xmlns:p14="http://schemas.microsoft.com/office/powerpoint/2010/main" val="2202249229"/>
+        <p14:creationId xmlns:p14="http://schemas.microsoft.com/office/powerpoint/2010/main" val="432997703"/>
       </p:ext>
     </p:extLst>
   </p:cSld>
@@ -7518,7 +8774,7 @@
           <p:cNvPr id="2" name="Title 1">
             <a:extLst>
               <a:ext uri="{FF2B5EF4-FFF2-40B4-BE49-F238E27FC236}">
-                <a16:creationId xmlns:a16="http://schemas.microsoft.com/office/drawing/2014/main" id="{5654AA42-1CB2-4AA9-9667-852CA24EEB17}"/>
+                <a16:creationId xmlns:a16="http://schemas.microsoft.com/office/drawing/2014/main" id="{B164165D-1237-484D-BBE5-DAA126E3E47F}"/>
               </a:ext>
             </a:extLst>
           </p:cNvPr>
@@ -7531,31 +8787,14 @@
         </p:nvSpPr>
         <p:spPr/>
         <p:txBody>
-          <a:bodyPr>
-            <a:normAutofit/>
-          </a:bodyPr>
-          <a:lstStyle/>
-          <a:p>
-            <a:pPr algn="l"/>
-            <a:r>
-              <a:rPr lang="en-GB" sz="4400" b="1" dirty="0">
-                <a:solidFill>
-                  <a:schemeClr val="accent3">
-                    <a:lumMod val="75000"/>
-                  </a:schemeClr>
-                </a:solidFill>
-                <a:latin typeface="Bahnschrift SemiCondensed" panose="020B0502040204020203" pitchFamily="34" charset="0"/>
-              </a:rPr>
-              <a:t>Conclusion</a:t>
-            </a:r>
-            <a:endParaRPr lang="en-AU" sz="4400" b="1" dirty="0">
-              <a:solidFill>
-                <a:schemeClr val="accent3">
-                  <a:lumMod val="75000"/>
-                </a:schemeClr>
-              </a:solidFill>
-              <a:latin typeface="Bahnschrift SemiCondensed" panose="020B0502040204020203" pitchFamily="34" charset="0"/>
-            </a:endParaRPr>
+          <a:bodyPr/>
+          <a:lstStyle/>
+          <a:p>
+            <a:r>
+              <a:rPr lang="en-US" dirty="0"/>
+              <a:t>Solution!</a:t>
+            </a:r>
+            <a:endParaRPr lang="en-AU" dirty="0"/>
           </a:p>
         </p:txBody>
       </p:sp>
@@ -7564,7 +8803,7 @@
           <p:cNvPr id="3" name="Content Placeholder 2">
             <a:extLst>
               <a:ext uri="{FF2B5EF4-FFF2-40B4-BE49-F238E27FC236}">
-                <a16:creationId xmlns:a16="http://schemas.microsoft.com/office/drawing/2014/main" id="{F1C7AD93-4D19-40ED-8E9A-21322641B2AA}"/>
+                <a16:creationId xmlns:a16="http://schemas.microsoft.com/office/drawing/2014/main" id="{7BBBE570-325C-4819-B9F9-D2C693DCD5E9}"/>
               </a:ext>
             </a:extLst>
           </p:cNvPr>
@@ -7572,14 +8811,12 @@
             <a:spLocks noGrp="1"/>
           </p:cNvSpPr>
           <p:nvPr>
-            <p:ph idx="1"/>
+            <p:ph sz="quarter" idx="13"/>
           </p:nvPr>
         </p:nvSpPr>
         <p:spPr/>
         <p:txBody>
-          <a:bodyPr>
-            <a:normAutofit/>
-          </a:bodyPr>
+          <a:bodyPr/>
           <a:lstStyle/>
           <a:p>
             <a:r>
@@ -7587,7 +8824,7 @@
                 <a:latin typeface="Calibri" panose="020F0502020204030204" pitchFamily="34" charset="0"/>
                 <a:cs typeface="Calibri" panose="020F0502020204030204" pitchFamily="34" charset="0"/>
               </a:rPr>
-              <a:t>A strong base has been developed that can be improved in future iterations</a:t>
+              <a:t>Ai literacy tool</a:t>
             </a:r>
           </a:p>
           <a:p>
@@ -7596,8 +8833,19 @@
                 <a:latin typeface="Calibri" panose="020F0502020204030204" pitchFamily="34" charset="0"/>
                 <a:cs typeface="Calibri" panose="020F0502020204030204" pitchFamily="34" charset="0"/>
               </a:rPr>
-              <a:t>Since this is a webapp, it can be hosted and accessed from anywhere</a:t>
-            </a:r>
+              <a:t>Online </a:t>
+            </a:r>
+            <a:r>
+              <a:rPr lang="en-GB" sz="1800" dirty="0" err="1">
+                <a:latin typeface="Calibri" panose="020F0502020204030204" pitchFamily="34" charset="0"/>
+                <a:cs typeface="Calibri" panose="020F0502020204030204" pitchFamily="34" charset="0"/>
+              </a:rPr>
+              <a:t>plaltform</a:t>
+            </a:r>
+            <a:endParaRPr lang="en-GB" sz="1800" dirty="0">
+              <a:latin typeface="Calibri" panose="020F0502020204030204" pitchFamily="34" charset="0"/>
+              <a:cs typeface="Calibri" panose="020F0502020204030204" pitchFamily="34" charset="0"/>
+            </a:endParaRPr>
           </a:p>
           <a:p>
             <a:r>
@@ -7605,7 +8853,7 @@
                 <a:latin typeface="Calibri" panose="020F0502020204030204" pitchFamily="34" charset="0"/>
                 <a:cs typeface="Calibri" panose="020F0502020204030204" pitchFamily="34" charset="0"/>
               </a:rPr>
-              <a:t>Simple and common technologies are used, hence debugging and modification are affordable</a:t>
+              <a:t>Interactive games explaining AI/ml  concepts</a:t>
             </a:r>
           </a:p>
           <a:p>
@@ -7614,19 +8862,176 @@
                 <a:latin typeface="Calibri" panose="020F0502020204030204" pitchFamily="34" charset="0"/>
                 <a:cs typeface="Calibri" panose="020F0502020204030204" pitchFamily="34" charset="0"/>
               </a:rPr>
-              <a:t>Can be employed as a self learning or teaching tool</a:t>
-            </a:r>
-            <a:endParaRPr lang="en-AU" sz="1800" dirty="0">
+              <a:t>User in control</a:t>
+            </a:r>
+          </a:p>
+          <a:p>
+            <a:r>
+              <a:rPr lang="en-US" sz="1800" dirty="0">
+                <a:latin typeface="Calibri" panose="020F0502020204030204" pitchFamily="34" charset="0"/>
+                <a:cs typeface="Calibri" panose="020F0502020204030204" pitchFamily="34" charset="0"/>
+              </a:rPr>
+              <a:t>Designed for kids</a:t>
+            </a:r>
+          </a:p>
+          <a:p>
+            <a:pPr lvl="1"/>
+            <a:r>
+              <a:rPr lang="en-US" sz="1600" dirty="0">
+                <a:latin typeface="Calibri" panose="020F0502020204030204" pitchFamily="34" charset="0"/>
+                <a:cs typeface="Calibri" panose="020F0502020204030204" pitchFamily="34" charset="0"/>
+              </a:rPr>
+              <a:t>Just drag and drop to make the machine intelligent!</a:t>
+            </a:r>
+          </a:p>
+          <a:p>
+            <a:r>
+              <a:rPr lang="en-US" sz="1800" dirty="0">
+                <a:latin typeface="Calibri" panose="020F0502020204030204" pitchFamily="34" charset="0"/>
+                <a:cs typeface="Calibri" panose="020F0502020204030204" pitchFamily="34" charset="0"/>
+              </a:rPr>
+              <a:t>Keeps them engaged</a:t>
+            </a:r>
+            <a:endParaRPr lang="en-AU" sz="1600" dirty="0">
               <a:latin typeface="Calibri" panose="020F0502020204030204" pitchFamily="34" charset="0"/>
               <a:cs typeface="Calibri" panose="020F0502020204030204" pitchFamily="34" charset="0"/>
             </a:endParaRPr>
           </a:p>
+          <a:p>
+            <a:endParaRPr lang="en-AU" dirty="0"/>
+          </a:p>
         </p:txBody>
       </p:sp>
     </p:spTree>
     <p:extLst>
       <p:ext uri="{BB962C8B-B14F-4D97-AF65-F5344CB8AC3E}">
-        <p14:creationId xmlns:p14="http://schemas.microsoft.com/office/powerpoint/2010/main" val="2214893645"/>
+        <p14:creationId xmlns:p14="http://schemas.microsoft.com/office/powerpoint/2010/main" val="3099743784"/>
+      </p:ext>
+    </p:extLst>
+  </p:cSld>
+  <p:clrMapOvr>
+    <a:masterClrMapping/>
+  </p:clrMapOvr>
+</p:sld>
+</file>
+
+<file path=ppt/slides/slide8.xml><?xml version="1.0" encoding="utf-8"?>
+<p:sld xmlns:a="http://schemas.openxmlformats.org/drawingml/2006/main" xmlns:r="http://schemas.openxmlformats.org/officeDocument/2006/relationships" xmlns:p="http://schemas.openxmlformats.org/presentationml/2006/main">
+  <p:cSld>
+    <p:spTree>
+      <p:nvGrpSpPr>
+        <p:cNvPr id="1" name=""/>
+        <p:cNvGrpSpPr/>
+        <p:nvPr/>
+      </p:nvGrpSpPr>
+      <p:grpSpPr>
+        <a:xfrm>
+          <a:off x="0" y="0"/>
+          <a:ext cx="0" cy="0"/>
+          <a:chOff x="0" y="0"/>
+          <a:chExt cx="0" cy="0"/>
+        </a:xfrm>
+      </p:grpSpPr>
+      <p:sp>
+        <p:nvSpPr>
+          <p:cNvPr id="2" name="Title 1">
+            <a:extLst>
+              <a:ext uri="{FF2B5EF4-FFF2-40B4-BE49-F238E27FC236}">
+                <a16:creationId xmlns:a16="http://schemas.microsoft.com/office/drawing/2014/main" id="{48616CF2-2D3F-4F0C-8652-C49934824D85}"/>
+              </a:ext>
+            </a:extLst>
+          </p:cNvPr>
+          <p:cNvSpPr>
+            <a:spLocks noGrp="1"/>
+          </p:cNvSpPr>
+          <p:nvPr>
+            <p:ph type="title"/>
+          </p:nvPr>
+        </p:nvSpPr>
+        <p:spPr>
+          <a:xfrm>
+            <a:off x="781695" y="2630911"/>
+            <a:ext cx="10364451" cy="1596177"/>
+          </a:xfrm>
+        </p:spPr>
+        <p:txBody>
+          <a:bodyPr/>
+          <a:lstStyle/>
+          <a:p>
+            <a:r>
+              <a:rPr lang="en-AU" dirty="0"/>
+              <a:t>DEMO of HOME PAGE</a:t>
+            </a:r>
+          </a:p>
+        </p:txBody>
+      </p:sp>
+    </p:spTree>
+    <p:extLst>
+      <p:ext uri="{BB962C8B-B14F-4D97-AF65-F5344CB8AC3E}">
+        <p14:creationId xmlns:p14="http://schemas.microsoft.com/office/powerpoint/2010/main" val="4068187834"/>
+      </p:ext>
+    </p:extLst>
+  </p:cSld>
+  <p:clrMapOvr>
+    <a:masterClrMapping/>
+  </p:clrMapOvr>
+</p:sld>
+</file>
+
+<file path=ppt/slides/slide9.xml><?xml version="1.0" encoding="utf-8"?>
+<p:sld xmlns:a="http://schemas.openxmlformats.org/drawingml/2006/main" xmlns:r="http://schemas.openxmlformats.org/officeDocument/2006/relationships" xmlns:p="http://schemas.openxmlformats.org/presentationml/2006/main">
+  <p:cSld>
+    <p:spTree>
+      <p:nvGrpSpPr>
+        <p:cNvPr id="1" name=""/>
+        <p:cNvGrpSpPr/>
+        <p:nvPr/>
+      </p:nvGrpSpPr>
+      <p:grpSpPr>
+        <a:xfrm>
+          <a:off x="0" y="0"/>
+          <a:ext cx="0" cy="0"/>
+          <a:chOff x="0" y="0"/>
+          <a:chExt cx="0" cy="0"/>
+        </a:xfrm>
+      </p:grpSpPr>
+      <p:sp>
+        <p:nvSpPr>
+          <p:cNvPr id="2" name="Title 1">
+            <a:extLst>
+              <a:ext uri="{FF2B5EF4-FFF2-40B4-BE49-F238E27FC236}">
+                <a16:creationId xmlns:a16="http://schemas.microsoft.com/office/drawing/2014/main" id="{FA69FFDD-B7CF-4A47-BF38-C301B12B53EB}"/>
+              </a:ext>
+            </a:extLst>
+          </p:cNvPr>
+          <p:cNvSpPr>
+            <a:spLocks noGrp="1"/>
+          </p:cNvSpPr>
+          <p:nvPr>
+            <p:ph type="title"/>
+          </p:nvPr>
+        </p:nvSpPr>
+        <p:spPr>
+          <a:xfrm>
+            <a:off x="913774" y="2630911"/>
+            <a:ext cx="10364451" cy="1596177"/>
+          </a:xfrm>
+        </p:spPr>
+        <p:txBody>
+          <a:bodyPr/>
+          <a:lstStyle/>
+          <a:p>
+            <a:r>
+              <a:rPr lang="en-AU" dirty="0"/>
+              <a:t>What will you learn?</a:t>
+            </a:r>
+          </a:p>
+        </p:txBody>
+      </p:sp>
+    </p:spTree>
+    <p:extLst>
+      <p:ext uri="{BB962C8B-B14F-4D97-AF65-F5344CB8AC3E}">
+        <p14:creationId xmlns:p14="http://schemas.microsoft.com/office/powerpoint/2010/main" val="2179246208"/>
       </p:ext>
     </p:extLst>
   </p:cSld>
@@ -7898,4 +9303,47 @@
     </a:ext>
   </a:extLst>
 </a:theme>
+</file>
+
+<file path=ppt/theme/themeOverride1.xml><?xml version="1.0" encoding="utf-8"?>
+<a:themeOverride xmlns:a="http://schemas.openxmlformats.org/drawingml/2006/main">
+  <a:clrScheme name="Droplet">
+    <a:dk1>
+      <a:sysClr val="windowText" lastClr="000000"/>
+    </a:dk1>
+    <a:lt1>
+      <a:sysClr val="window" lastClr="FFFFFF"/>
+    </a:lt1>
+    <a:dk2>
+      <a:srgbClr val="355071"/>
+    </a:dk2>
+    <a:lt2>
+      <a:srgbClr val="AABED7"/>
+    </a:lt2>
+    <a:accent1>
+      <a:srgbClr val="2FA3EE"/>
+    </a:accent1>
+    <a:accent2>
+      <a:srgbClr val="4BCAAD"/>
+    </a:accent2>
+    <a:accent3>
+      <a:srgbClr val="86C157"/>
+    </a:accent3>
+    <a:accent4>
+      <a:srgbClr val="D99C3F"/>
+    </a:accent4>
+    <a:accent5>
+      <a:srgbClr val="CE6633"/>
+    </a:accent5>
+    <a:accent6>
+      <a:srgbClr val="A35DD1"/>
+    </a:accent6>
+    <a:hlink>
+      <a:srgbClr val="56BCFE"/>
+    </a:hlink>
+    <a:folHlink>
+      <a:srgbClr val="97C5E3"/>
+    </a:folHlink>
+  </a:clrScheme>
+</a:themeOverride>
 </file>
</xml_diff>